<commit_message>
Added images for ChangeThemeCommand
</commit_message>
<xml_diff>
--- a/docs/diagrams/OrderManagementUMLDiagrams.pptx
+++ b/docs/diagrams/OrderManagementUMLDiagrams.pptx
@@ -9019,18 +9019,18 @@
         <p:cxnSp>
           <p:nvCxnSpPr>
             <p:cNvPr id="26" name="Elbow Connector 25"/>
-            <p:cNvCxnSpPr/>
+            <p:cNvCxnSpPr>
+              <a:endCxn id="21" idx="3"/>
+            </p:cNvCxnSpPr>
             <p:nvPr/>
           </p:nvCxnSpPr>
           <p:spPr>
-            <a:xfrm>
-              <a:off x="2291022" y="2754118"/>
-              <a:ext cx="528378" cy="430990"/>
-            </a:xfrm>
-            <a:prstGeom prst="bentConnector3">
-              <a:avLst>
-                <a:gd name="adj1" fmla="val -14558"/>
-              </a:avLst>
+            <a:xfrm rot="16200000" flipH="1">
+              <a:off x="2167335" y="2609244"/>
+              <a:ext cx="618331" cy="533397"/>
+            </a:xfrm>
+            <a:prstGeom prst="bentConnector2">
+              <a:avLst/>
             </a:prstGeom>
             <a:ln w="19050">
               <a:headEnd type="none" w="med" len="med"/>
@@ -9091,10 +9091,10 @@
         </p:nvGrpSpPr>
         <p:grpSpPr>
           <a:xfrm>
-            <a:off x="152400" y="533400"/>
-            <a:ext cx="8759706" cy="2164943"/>
+            <a:off x="228600" y="1981200"/>
+            <a:ext cx="9128536" cy="2164943"/>
             <a:chOff x="152400" y="533400"/>
-            <a:chExt cx="8759706" cy="2164943"/>
+            <a:chExt cx="9128536" cy="2164943"/>
           </a:xfrm>
         </p:grpSpPr>
         <p:sp>
@@ -9890,7 +9890,7 @@
           </p:nvSpPr>
           <p:spPr>
             <a:xfrm>
-              <a:off x="2752426" y="1528835"/>
+              <a:off x="3037471" y="1519215"/>
               <a:ext cx="966739" cy="184666"/>
             </a:xfrm>
             <a:prstGeom prst="rect">
@@ -9972,8 +9972,8 @@
           </p:nvSpPr>
           <p:spPr>
             <a:xfrm>
-              <a:off x="4206157" y="1621167"/>
-              <a:ext cx="1706497" cy="184666"/>
+              <a:off x="4751362" y="1611548"/>
+              <a:ext cx="1706497" cy="369332"/>
             </a:xfrm>
             <a:prstGeom prst="rect">
               <a:avLst/>
@@ -9992,7 +9992,22 @@
                     <a:srgbClr val="7030A0"/>
                   </a:solidFill>
                 </a:rPr>
-                <a:t>addOrderToOrderList</a:t>
+                <a:t>addOrder</a:t>
+              </a:r>
+              <a:endParaRPr lang="en-US" sz="1200" dirty="0" smtClean="0">
+                <a:solidFill>
+                  <a:srgbClr val="7030A0"/>
+                </a:solidFill>
+              </a:endParaRPr>
+            </a:p>
+            <a:p>
+              <a:r>
+                <a:rPr lang="en-US" sz="1200" dirty="0" err="1" smtClean="0">
+                  <a:solidFill>
+                    <a:srgbClr val="7030A0"/>
+                  </a:solidFill>
+                </a:rPr>
+                <a:t>ToOrderList</a:t>
               </a:r>
               <a:r>
                 <a:rPr lang="en-US" sz="1200" dirty="0" smtClean="0">
@@ -10018,8 +10033,8 @@
           </p:nvSpPr>
           <p:spPr>
             <a:xfrm>
-              <a:off x="6067947" y="1671130"/>
-              <a:ext cx="2314053" cy="184666"/>
+              <a:off x="6966883" y="1511014"/>
+              <a:ext cx="2314053" cy="369332"/>
             </a:xfrm>
             <a:prstGeom prst="rect">
               <a:avLst/>
@@ -10033,7 +10048,7 @@
             <a:lstStyle/>
             <a:p>
               <a:r>
-                <a:rPr lang="en-US" sz="1200" dirty="0" smtClean="0">
+                <a:rPr lang="en-US" sz="1200" smtClean="0">
                   <a:solidFill>
                     <a:schemeClr val="accent5">
                       <a:lumMod val="75000"/>
@@ -10050,7 +10065,26 @@
                     </a:schemeClr>
                   </a:solidFill>
                 </a:rPr>
-                <a:t>AddressBookChangedEvent</a:t>
+                <a:t>AddressBook</a:t>
+              </a:r>
+              <a:endParaRPr lang="en-US" sz="1200" dirty="0" smtClean="0">
+                <a:solidFill>
+                  <a:schemeClr val="accent5">
+                    <a:lumMod val="75000"/>
+                  </a:schemeClr>
+                </a:solidFill>
+              </a:endParaRPr>
+            </a:p>
+            <a:p>
+              <a:r>
+                <a:rPr lang="en-US" sz="1200" dirty="0" err="1" smtClean="0">
+                  <a:solidFill>
+                    <a:schemeClr val="accent5">
+                      <a:lumMod val="75000"/>
+                    </a:schemeClr>
+                  </a:solidFill>
+                </a:rPr>
+                <a:t>ChangedEvent</a:t>
               </a:r>
               <a:r>
                 <a:rPr lang="en-US" sz="1200" dirty="0" smtClean="0">
@@ -16548,8 +16582,8 @@
           </p:nvSpPr>
           <p:spPr>
             <a:xfrm>
-              <a:off x="4343400" y="3564523"/>
-              <a:ext cx="1580463" cy="169277"/>
+              <a:off x="4234098" y="3386035"/>
+              <a:ext cx="1580463" cy="338554"/>
             </a:xfrm>
             <a:prstGeom prst="rect">
               <a:avLst/>
@@ -16574,8 +16608,15 @@
             </a:lstStyle>
             <a:p>
               <a:r>
-                <a:rPr lang="en-US" sz="1100" dirty="0" err="1" smtClean="0"/>
-                <a:t>updateOrderStatus</a:t>
+                <a:rPr lang="en-US" sz="1100" smtClean="0"/>
+                <a:t>updateOrder</a:t>
+              </a:r>
+              <a:endParaRPr lang="en-US" sz="1100" dirty="0" smtClean="0"/>
+            </a:p>
+            <a:p>
+              <a:r>
+                <a:rPr lang="en-US" sz="1100" dirty="0" smtClean="0"/>
+                <a:t>Status</a:t>
               </a:r>
               <a:r>
                 <a:rPr lang="en-US" sz="1100" dirty="0" smtClean="0"/>
@@ -17402,7 +17443,7 @@
           </p:nvSpPr>
           <p:spPr>
             <a:xfrm>
-              <a:off x="4283494" y="4000241"/>
+              <a:off x="4895687" y="3958568"/>
               <a:ext cx="780823" cy="169277"/>
             </a:xfrm>
             <a:prstGeom prst="rect">
@@ -20323,7 +20364,7 @@
           </p:nvSpPr>
           <p:spPr>
             <a:xfrm>
-              <a:off x="4283494" y="4000241"/>
+              <a:off x="4829379" y="4004390"/>
               <a:ext cx="780823" cy="169277"/>
             </a:xfrm>
             <a:prstGeom prst="rect">

</xml_diff>

<commit_message>
Corrected images and updated description in 3.4
</commit_message>
<xml_diff>
--- a/docs/diagrams/OrderManagementUMLDiagrams.pptx
+++ b/docs/diagrams/OrderManagementUMLDiagrams.pptx
@@ -7868,15 +7868,7 @@
                       <a:schemeClr val="bg1"/>
                     </a:solidFill>
                   </a:rPr>
-                  <a:t>Model</a:t>
-                </a:r>
-                <a:r>
-                  <a:rPr lang="en-US" sz="1050" dirty="0" err="1" smtClean="0">
-                    <a:solidFill>
-                      <a:schemeClr val="bg1"/>
-                    </a:solidFill>
-                  </a:rPr>
-                  <a:t>Manager</a:t>
+                  <a:t>ModelManager</a:t>
                 </a:r>
                 <a:endParaRPr lang="en-SG" sz="1050" dirty="0">
                   <a:solidFill>
@@ -8174,11 +8166,6 @@
                   </a:rPr>
                   <a:t>*</a:t>
                 </a:r>
-                <a:endParaRPr lang="en-GB" sz="1200" dirty="0">
-                  <a:solidFill>
-                    <a:srgbClr val="9BBC59"/>
-                  </a:solidFill>
-                </a:endParaRPr>
               </a:p>
             </p:txBody>
           </p:sp>
@@ -8862,15 +8849,7 @@
                     <a:srgbClr val="0070C0"/>
                   </a:solidFill>
                 </a:rPr>
-                <a:t>EditOrder</a:t>
-              </a:r>
-              <a:r>
-                <a:rPr lang="en-US" sz="1050" b="1" smtClean="0">
-                  <a:solidFill>
-                    <a:srgbClr val="0070C0"/>
-                  </a:solidFill>
-                </a:rPr>
-                <a:t>Command</a:t>
+                <a:t>EditOrderCommand</a:t>
               </a:r>
               <a:endParaRPr lang="en-US" sz="1050" b="1" dirty="0">
                 <a:solidFill>
@@ -8998,15 +8977,7 @@
                     <a:srgbClr val="0070C0"/>
                   </a:solidFill>
                 </a:rPr>
-                <a:t>Delete</a:t>
-              </a:r>
-              <a:r>
-                <a:rPr lang="en-US" sz="1050" b="1" dirty="0" err="1" smtClean="0">
-                  <a:solidFill>
-                    <a:srgbClr val="0070C0"/>
-                  </a:solidFill>
-                </a:rPr>
-                <a:t>OrderCommand</a:t>
+                <a:t>DeleteOrderCommand</a:t>
               </a:r>
               <a:endParaRPr lang="en-US" sz="1050" b="1" dirty="0">
                 <a:solidFill>
@@ -9816,15 +9787,7 @@
               <a:pPr algn="r"/>
               <a:r>
                 <a:rPr lang="en-US" sz="1200" dirty="0" smtClean="0"/>
-                <a:t>orderadd</a:t>
-              </a:r>
-              <a:r>
-                <a:rPr lang="en-US" sz="1200" dirty="0" smtClean="0"/>
-                <a:t> 1 </a:t>
-              </a:r>
-              <a:r>
-                <a:rPr lang="en-US" sz="1200" dirty="0" smtClean="0"/>
-                <a:t>i/Books</a:t>
+                <a:t>orderadd 1 i/Books</a:t>
               </a:r>
             </a:p>
             <a:p>
@@ -9910,15 +9873,7 @@
                     <a:srgbClr val="0070C0"/>
                   </a:solidFill>
                 </a:rPr>
-                <a:t>execute</a:t>
-              </a:r>
-              <a:r>
-                <a:rPr lang="en-US" sz="1200" smtClean="0">
-                  <a:solidFill>
-                    <a:srgbClr val="0070C0"/>
-                  </a:solidFill>
-                </a:rPr>
-                <a:t>()</a:t>
+                <a:t>execute()</a:t>
               </a:r>
               <a:endParaRPr lang="en-US" sz="1200" dirty="0">
                 <a:solidFill>
@@ -10552,7 +10507,7 @@
             <p:cNvPr id="2" name="Rectangle 65">
               <a:extLst>
                 <a:ext uri="{FF2B5EF4-FFF2-40B4-BE49-F238E27FC236}">
-                  <a16:creationId xmlns:a16="http://schemas.microsoft.com/office/drawing/2014/main" xmlns="" id="{2126271C-590E-4B60-8868-3D59B556D0C2}"/>
+                  <a16:creationId xmlns="" xmlns:a16="http://schemas.microsoft.com/office/drawing/2014/main" id="{2126271C-590E-4B60-8868-3D59B556D0C2}"/>
                 </a:ext>
               </a:extLst>
             </p:cNvPr>
@@ -11106,7 +11061,7 @@
             <p:cNvPr id="16" name="Straight Arrow Connector 15">
               <a:extLst>
                 <a:ext uri="{FF2B5EF4-FFF2-40B4-BE49-F238E27FC236}">
-                  <a16:creationId xmlns:a16="http://schemas.microsoft.com/office/drawing/2014/main" xmlns="" id="{854D9FBB-2B36-4DC9-8B58-F7F177A8E586}"/>
+                  <a16:creationId xmlns="" xmlns:a16="http://schemas.microsoft.com/office/drawing/2014/main" id="{854D9FBB-2B36-4DC9-8B58-F7F177A8E586}"/>
                 </a:ext>
               </a:extLst>
             </p:cNvPr>
@@ -11153,7 +11108,7 @@
             <p:cNvPr id="18" name="Straight Arrow Connector 17">
               <a:extLst>
                 <a:ext uri="{FF2B5EF4-FFF2-40B4-BE49-F238E27FC236}">
-                  <a16:creationId xmlns:a16="http://schemas.microsoft.com/office/drawing/2014/main" xmlns="" id="{DDEE7225-6527-47E2-9C48-DE9485DD5A4F}"/>
+                  <a16:creationId xmlns="" xmlns:a16="http://schemas.microsoft.com/office/drawing/2014/main" id="{DDEE7225-6527-47E2-9C48-DE9485DD5A4F}"/>
                 </a:ext>
               </a:extLst>
             </p:cNvPr>
@@ -11197,7 +11152,7 @@
             <p:cNvPr id="20" name="Straight Arrow Connector 19">
               <a:extLst>
                 <a:ext uri="{FF2B5EF4-FFF2-40B4-BE49-F238E27FC236}">
-                  <a16:creationId xmlns:a16="http://schemas.microsoft.com/office/drawing/2014/main" xmlns="" id="{BF9AEA9C-54D0-4CB0-AE49-51A566B69F58}"/>
+                  <a16:creationId xmlns="" xmlns:a16="http://schemas.microsoft.com/office/drawing/2014/main" id="{BF9AEA9C-54D0-4CB0-AE49-51A566B69F58}"/>
                 </a:ext>
               </a:extLst>
             </p:cNvPr>
@@ -11243,7 +11198,7 @@
             <p:cNvPr id="21" name="Rectangle 62">
               <a:extLst>
                 <a:ext uri="{FF2B5EF4-FFF2-40B4-BE49-F238E27FC236}">
-                  <a16:creationId xmlns:a16="http://schemas.microsoft.com/office/drawing/2014/main" xmlns="" id="{61FF3397-EF07-4016-8098-DAEF482C4389}"/>
+                  <a16:creationId xmlns="" xmlns:a16="http://schemas.microsoft.com/office/drawing/2014/main" id="{61FF3397-EF07-4016-8098-DAEF482C4389}"/>
                 </a:ext>
               </a:extLst>
             </p:cNvPr>
@@ -11316,7 +11271,7 @@
             <p:cNvPr id="22" name="Straight Connector 21">
               <a:extLst>
                 <a:ext uri="{FF2B5EF4-FFF2-40B4-BE49-F238E27FC236}">
-                  <a16:creationId xmlns:a16="http://schemas.microsoft.com/office/drawing/2014/main" xmlns="" id="{22D3ED81-D4BA-4011-B139-8213177BA215}"/>
+                  <a16:creationId xmlns="" xmlns:a16="http://schemas.microsoft.com/office/drawing/2014/main" id="{22D3ED81-D4BA-4011-B139-8213177BA215}"/>
                 </a:ext>
               </a:extLst>
             </p:cNvPr>
@@ -11361,7 +11316,7 @@
             <p:cNvPr id="23" name="Rectangle 22">
               <a:extLst>
                 <a:ext uri="{FF2B5EF4-FFF2-40B4-BE49-F238E27FC236}">
-                  <a16:creationId xmlns:a16="http://schemas.microsoft.com/office/drawing/2014/main" xmlns="" id="{A96B530B-5601-46A7-9B8D-33C8DDA39964}"/>
+                  <a16:creationId xmlns="" xmlns:a16="http://schemas.microsoft.com/office/drawing/2014/main" id="{A96B530B-5601-46A7-9B8D-33C8DDA39964}"/>
                 </a:ext>
               </a:extLst>
             </p:cNvPr>
@@ -11414,7 +11369,7 @@
             <p:cNvPr id="25" name="TextBox 24">
               <a:extLst>
                 <a:ext uri="{FF2B5EF4-FFF2-40B4-BE49-F238E27FC236}">
-                  <a16:creationId xmlns:a16="http://schemas.microsoft.com/office/drawing/2014/main" xmlns="" id="{95F03D45-B1FD-49BA-8758-8ED58ACA2B5C}"/>
+                  <a16:creationId xmlns="" xmlns:a16="http://schemas.microsoft.com/office/drawing/2014/main" id="{95F03D45-B1FD-49BA-8758-8ED58ACA2B5C}"/>
                 </a:ext>
               </a:extLst>
             </p:cNvPr>
@@ -11477,7 +11432,7 @@
             <p:cNvPr id="27" name="Straight Connector 26">
               <a:extLst>
                 <a:ext uri="{FF2B5EF4-FFF2-40B4-BE49-F238E27FC236}">
-                  <a16:creationId xmlns:a16="http://schemas.microsoft.com/office/drawing/2014/main" xmlns="" id="{2DA8FBC2-6B42-43C0-BBEC-CF189FD87668}"/>
+                  <a16:creationId xmlns="" xmlns:a16="http://schemas.microsoft.com/office/drawing/2014/main" id="{2DA8FBC2-6B42-43C0-BBEC-CF189FD87668}"/>
                 </a:ext>
               </a:extLst>
             </p:cNvPr>
@@ -11522,7 +11477,7 @@
             <p:cNvPr id="28" name="Rectangle 27">
               <a:extLst>
                 <a:ext uri="{FF2B5EF4-FFF2-40B4-BE49-F238E27FC236}">
-                  <a16:creationId xmlns:a16="http://schemas.microsoft.com/office/drawing/2014/main" xmlns="" id="{04305CEA-EBD1-45C9-97BE-ECFE3AC3D249}"/>
+                  <a16:creationId xmlns="" xmlns:a16="http://schemas.microsoft.com/office/drawing/2014/main" id="{04305CEA-EBD1-45C9-97BE-ECFE3AC3D249}"/>
                 </a:ext>
               </a:extLst>
             </p:cNvPr>
@@ -11575,7 +11530,7 @@
             <p:cNvPr id="32" name="TextBox 31">
               <a:extLst>
                 <a:ext uri="{FF2B5EF4-FFF2-40B4-BE49-F238E27FC236}">
-                  <a16:creationId xmlns:a16="http://schemas.microsoft.com/office/drawing/2014/main" xmlns="" id="{81B0FA7A-7734-4574-BB3A-865D46A3AB9C}"/>
+                  <a16:creationId xmlns="" xmlns:a16="http://schemas.microsoft.com/office/drawing/2014/main" id="{81B0FA7A-7734-4574-BB3A-865D46A3AB9C}"/>
                 </a:ext>
               </a:extLst>
             </p:cNvPr>
@@ -11625,7 +11580,7 @@
             <p:cNvPr id="33" name="TextBox 32">
               <a:extLst>
                 <a:ext uri="{FF2B5EF4-FFF2-40B4-BE49-F238E27FC236}">
-                  <a16:creationId xmlns:a16="http://schemas.microsoft.com/office/drawing/2014/main" xmlns="" id="{E89E7A9A-19E7-4F1A-ABAF-9356340673CC}"/>
+                  <a16:creationId xmlns="" xmlns:a16="http://schemas.microsoft.com/office/drawing/2014/main" id="{E89E7A9A-19E7-4F1A-ABAF-9356340673CC}"/>
                 </a:ext>
               </a:extLst>
             </p:cNvPr>
@@ -11675,7 +11630,7 @@
             <p:cNvPr id="34" name="Rectangle 33">
               <a:extLst>
                 <a:ext uri="{FF2B5EF4-FFF2-40B4-BE49-F238E27FC236}">
-                  <a16:creationId xmlns:a16="http://schemas.microsoft.com/office/drawing/2014/main" xmlns="" id="{12879DF9-F252-4947-8358-26D8F2FD6F25}"/>
+                  <a16:creationId xmlns="" xmlns:a16="http://schemas.microsoft.com/office/drawing/2014/main" id="{12879DF9-F252-4947-8358-26D8F2FD6F25}"/>
                 </a:ext>
               </a:extLst>
             </p:cNvPr>
@@ -11728,7 +11683,7 @@
             <p:cNvPr id="36" name="Straight Arrow Connector 35">
               <a:extLst>
                 <a:ext uri="{FF2B5EF4-FFF2-40B4-BE49-F238E27FC236}">
-                  <a16:creationId xmlns:a16="http://schemas.microsoft.com/office/drawing/2014/main" xmlns="" id="{A1426F86-A101-449E-8BB7-81C92FFDABFC}"/>
+                  <a16:creationId xmlns="" xmlns:a16="http://schemas.microsoft.com/office/drawing/2014/main" id="{A1426F86-A101-449E-8BB7-81C92FFDABFC}"/>
                 </a:ext>
               </a:extLst>
             </p:cNvPr>
@@ -11772,7 +11727,7 @@
             <p:cNvPr id="37" name="Straight Arrow Connector 36">
               <a:extLst>
                 <a:ext uri="{FF2B5EF4-FFF2-40B4-BE49-F238E27FC236}">
-                  <a16:creationId xmlns:a16="http://schemas.microsoft.com/office/drawing/2014/main" xmlns="" id="{5A692F45-A4BC-4FF9-B3C1-7CEA15013252}"/>
+                  <a16:creationId xmlns="" xmlns:a16="http://schemas.microsoft.com/office/drawing/2014/main" id="{5A692F45-A4BC-4FF9-B3C1-7CEA15013252}"/>
                 </a:ext>
               </a:extLst>
             </p:cNvPr>
@@ -11818,7 +11773,7 @@
             <p:cNvPr id="38" name="Straight Arrow Connector 37">
               <a:extLst>
                 <a:ext uri="{FF2B5EF4-FFF2-40B4-BE49-F238E27FC236}">
-                  <a16:creationId xmlns:a16="http://schemas.microsoft.com/office/drawing/2014/main" xmlns="" id="{F316D50F-9AF5-45BB-A814-DED5EA02E797}"/>
+                  <a16:creationId xmlns="" xmlns:a16="http://schemas.microsoft.com/office/drawing/2014/main" id="{F316D50F-9AF5-45BB-A814-DED5EA02E797}"/>
                 </a:ext>
               </a:extLst>
             </p:cNvPr>
@@ -11862,7 +11817,7 @@
             <p:cNvPr id="39" name="Straight Arrow Connector 38">
               <a:extLst>
                 <a:ext uri="{FF2B5EF4-FFF2-40B4-BE49-F238E27FC236}">
-                  <a16:creationId xmlns:a16="http://schemas.microsoft.com/office/drawing/2014/main" xmlns="" id="{0C2EB6B9-B95A-43BC-861F-54F7C85EECD7}"/>
+                  <a16:creationId xmlns="" xmlns:a16="http://schemas.microsoft.com/office/drawing/2014/main" id="{0C2EB6B9-B95A-43BC-861F-54F7C85EECD7}"/>
                 </a:ext>
               </a:extLst>
             </p:cNvPr>
@@ -11908,7 +11863,7 @@
             <p:cNvPr id="35" name="Rectangle 62">
               <a:extLst>
                 <a:ext uri="{FF2B5EF4-FFF2-40B4-BE49-F238E27FC236}">
-                  <a16:creationId xmlns:a16="http://schemas.microsoft.com/office/drawing/2014/main" xmlns="" id="{298D4E7E-EED8-491B-8A0A-5EA4EA725539}"/>
+                  <a16:creationId xmlns="" xmlns:a16="http://schemas.microsoft.com/office/drawing/2014/main" id="{298D4E7E-EED8-491B-8A0A-5EA4EA725539}"/>
                 </a:ext>
               </a:extLst>
             </p:cNvPr>
@@ -11981,7 +11936,7 @@
             <p:cNvPr id="40" name="TextBox 39">
               <a:extLst>
                 <a:ext uri="{FF2B5EF4-FFF2-40B4-BE49-F238E27FC236}">
-                  <a16:creationId xmlns:a16="http://schemas.microsoft.com/office/drawing/2014/main" xmlns="" id="{8A66125C-0A8A-4B7E-AFDE-067D51EC70EE}"/>
+                  <a16:creationId xmlns="" xmlns:a16="http://schemas.microsoft.com/office/drawing/2014/main" id="{8A66125C-0A8A-4B7E-AFDE-067D51EC70EE}"/>
                 </a:ext>
               </a:extLst>
             </p:cNvPr>
@@ -12035,7 +11990,7 @@
             <p:cNvPr id="41" name="Rectangle 40">
               <a:extLst>
                 <a:ext uri="{FF2B5EF4-FFF2-40B4-BE49-F238E27FC236}">
-                  <a16:creationId xmlns:a16="http://schemas.microsoft.com/office/drawing/2014/main" xmlns="" id="{22D2FCA0-7BE2-46D8-B8D6-DE64A1E34A9F}"/>
+                  <a16:creationId xmlns="" xmlns:a16="http://schemas.microsoft.com/office/drawing/2014/main" id="{22D2FCA0-7BE2-46D8-B8D6-DE64A1E34A9F}"/>
                 </a:ext>
               </a:extLst>
             </p:cNvPr>
@@ -12088,7 +12043,7 @@
             <p:cNvPr id="42" name="Straight Arrow Connector 41">
               <a:extLst>
                 <a:ext uri="{FF2B5EF4-FFF2-40B4-BE49-F238E27FC236}">
-                  <a16:creationId xmlns:a16="http://schemas.microsoft.com/office/drawing/2014/main" xmlns="" id="{9FF4C9C2-8F37-4F5A-A44E-ACB1B565C80F}"/>
+                  <a16:creationId xmlns="" xmlns:a16="http://schemas.microsoft.com/office/drawing/2014/main" id="{9FF4C9C2-8F37-4F5A-A44E-ACB1B565C80F}"/>
                 </a:ext>
               </a:extLst>
             </p:cNvPr>
@@ -12134,7 +12089,7 @@
             <p:cNvPr id="44" name="TextBox 43">
               <a:extLst>
                 <a:ext uri="{FF2B5EF4-FFF2-40B4-BE49-F238E27FC236}">
-                  <a16:creationId xmlns:a16="http://schemas.microsoft.com/office/drawing/2014/main" xmlns="" id="{CAF6EAA2-E1B3-4146-9FD1-EED02820840E}"/>
+                  <a16:creationId xmlns="" xmlns:a16="http://schemas.microsoft.com/office/drawing/2014/main" id="{CAF6EAA2-E1B3-4146-9FD1-EED02820840E}"/>
                 </a:ext>
               </a:extLst>
             </p:cNvPr>
@@ -12173,7 +12128,7 @@
             <p:cNvPr id="45" name="Straight Arrow Connector 44">
               <a:extLst>
                 <a:ext uri="{FF2B5EF4-FFF2-40B4-BE49-F238E27FC236}">
-                  <a16:creationId xmlns:a16="http://schemas.microsoft.com/office/drawing/2014/main" xmlns="" id="{3DB62E95-D983-49BD-93B5-D53F5ED931D4}"/>
+                  <a16:creationId xmlns="" xmlns:a16="http://schemas.microsoft.com/office/drawing/2014/main" id="{3DB62E95-D983-49BD-93B5-D53F5ED931D4}"/>
                 </a:ext>
               </a:extLst>
             </p:cNvPr>
@@ -12217,7 +12172,7 @@
             <p:cNvPr id="46" name="TextBox 45">
               <a:extLst>
                 <a:ext uri="{FF2B5EF4-FFF2-40B4-BE49-F238E27FC236}">
-                  <a16:creationId xmlns:a16="http://schemas.microsoft.com/office/drawing/2014/main" xmlns="" id="{0C0656C6-C19E-4524-AFA8-7C3E64F61000}"/>
+                  <a16:creationId xmlns="" xmlns:a16="http://schemas.microsoft.com/office/drawing/2014/main" id="{0C0656C6-C19E-4524-AFA8-7C3E64F61000}"/>
                 </a:ext>
               </a:extLst>
             </p:cNvPr>
@@ -12263,7 +12218,7 @@
             <p:cNvPr id="47" name="TextBox 46">
               <a:extLst>
                 <a:ext uri="{FF2B5EF4-FFF2-40B4-BE49-F238E27FC236}">
-                  <a16:creationId xmlns:a16="http://schemas.microsoft.com/office/drawing/2014/main" xmlns="" id="{89829A4E-2BD6-44C2-95D7-541B8F82E923}"/>
+                  <a16:creationId xmlns="" xmlns:a16="http://schemas.microsoft.com/office/drawing/2014/main" id="{89829A4E-2BD6-44C2-95D7-541B8F82E923}"/>
                 </a:ext>
               </a:extLst>
             </p:cNvPr>
@@ -12347,7 +12302,7 @@
             <p:cNvPr id="90" name="Rectangle 62">
               <a:extLst>
                 <a:ext uri="{FF2B5EF4-FFF2-40B4-BE49-F238E27FC236}">
-                  <a16:creationId xmlns:a16="http://schemas.microsoft.com/office/drawing/2014/main" xmlns="" id="{298D4E7E-EED8-491B-8A0A-5EA4EA725539}"/>
+                  <a16:creationId xmlns="" xmlns:a16="http://schemas.microsoft.com/office/drawing/2014/main" id="{298D4E7E-EED8-491B-8A0A-5EA4EA725539}"/>
                 </a:ext>
               </a:extLst>
             </p:cNvPr>
@@ -12451,7 +12406,7 @@
             <p:cNvPr id="93" name="Rectangle 92">
               <a:extLst>
                 <a:ext uri="{FF2B5EF4-FFF2-40B4-BE49-F238E27FC236}">
-                  <a16:creationId xmlns:a16="http://schemas.microsoft.com/office/drawing/2014/main" xmlns="" id="{22D2FCA0-7BE2-46D8-B8D6-DE64A1E34A9F}"/>
+                  <a16:creationId xmlns="" xmlns:a16="http://schemas.microsoft.com/office/drawing/2014/main" id="{22D2FCA0-7BE2-46D8-B8D6-DE64A1E34A9F}"/>
                 </a:ext>
               </a:extLst>
             </p:cNvPr>
@@ -12504,7 +12459,7 @@
             <p:cNvPr id="94" name="Straight Arrow Connector 93">
               <a:extLst>
                 <a:ext uri="{FF2B5EF4-FFF2-40B4-BE49-F238E27FC236}">
-                  <a16:creationId xmlns:a16="http://schemas.microsoft.com/office/drawing/2014/main" xmlns="" id="{22607DA0-7EBB-4D04-93AE-CFD259F847D9}"/>
+                  <a16:creationId xmlns="" xmlns:a16="http://schemas.microsoft.com/office/drawing/2014/main" id="{22607DA0-7EBB-4D04-93AE-CFD259F847D9}"/>
                 </a:ext>
               </a:extLst>
             </p:cNvPr>
@@ -12597,7 +12552,7 @@
             <p:cNvPr id="731" name="Straight Arrow Connector 730">
               <a:extLst>
                 <a:ext uri="{FF2B5EF4-FFF2-40B4-BE49-F238E27FC236}">
-                  <a16:creationId xmlns:a16="http://schemas.microsoft.com/office/drawing/2014/main" xmlns="" id="{9FF4C9C2-8F37-4F5A-A44E-ACB1B565C80F}"/>
+                  <a16:creationId xmlns="" xmlns:a16="http://schemas.microsoft.com/office/drawing/2014/main" id="{9FF4C9C2-8F37-4F5A-A44E-ACB1B565C80F}"/>
                 </a:ext>
               </a:extLst>
             </p:cNvPr>
@@ -12643,7 +12598,7 @@
             <p:cNvPr id="747" name="Rectangle 62">
               <a:extLst>
                 <a:ext uri="{FF2B5EF4-FFF2-40B4-BE49-F238E27FC236}">
-                  <a16:creationId xmlns:a16="http://schemas.microsoft.com/office/drawing/2014/main" xmlns="" id="{298D4E7E-EED8-491B-8A0A-5EA4EA725539}"/>
+                  <a16:creationId xmlns="" xmlns:a16="http://schemas.microsoft.com/office/drawing/2014/main" id="{298D4E7E-EED8-491B-8A0A-5EA4EA725539}"/>
                 </a:ext>
               </a:extLst>
             </p:cNvPr>
@@ -12719,7 +12674,7 @@
             <p:cNvPr id="753" name="Straight Arrow Connector 752">
               <a:extLst>
                 <a:ext uri="{FF2B5EF4-FFF2-40B4-BE49-F238E27FC236}">
-                  <a16:creationId xmlns:a16="http://schemas.microsoft.com/office/drawing/2014/main" xmlns="" id="{39916E2E-195A-4DC8-B025-B05FA87E6796}"/>
+                  <a16:creationId xmlns="" xmlns:a16="http://schemas.microsoft.com/office/drawing/2014/main" id="{39916E2E-195A-4DC8-B025-B05FA87E6796}"/>
                 </a:ext>
               </a:extLst>
             </p:cNvPr>
@@ -12849,7 +12804,7 @@
             <p:cNvPr id="774" name="Rectangle 773">
               <a:extLst>
                 <a:ext uri="{FF2B5EF4-FFF2-40B4-BE49-F238E27FC236}">
-                  <a16:creationId xmlns:a16="http://schemas.microsoft.com/office/drawing/2014/main" xmlns="" id="{12879DF9-F252-4947-8358-26D8F2FD6F25}"/>
+                  <a16:creationId xmlns="" xmlns:a16="http://schemas.microsoft.com/office/drawing/2014/main" id="{12879DF9-F252-4947-8358-26D8F2FD6F25}"/>
                 </a:ext>
               </a:extLst>
             </p:cNvPr>
@@ -12902,7 +12857,7 @@
             <p:cNvPr id="777" name="Straight Arrow Connector 776">
               <a:extLst>
                 <a:ext uri="{FF2B5EF4-FFF2-40B4-BE49-F238E27FC236}">
-                  <a16:creationId xmlns:a16="http://schemas.microsoft.com/office/drawing/2014/main" xmlns="" id="{5A692F45-A4BC-4FF9-B3C1-7CEA15013252}"/>
+                  <a16:creationId xmlns="" xmlns:a16="http://schemas.microsoft.com/office/drawing/2014/main" id="{5A692F45-A4BC-4FF9-B3C1-7CEA15013252}"/>
                 </a:ext>
               </a:extLst>
             </p:cNvPr>
@@ -12988,7 +12943,7 @@
             <p:cNvPr id="26" name="Rectangle 62">
               <a:extLst>
                 <a:ext uri="{FF2B5EF4-FFF2-40B4-BE49-F238E27FC236}">
-                  <a16:creationId xmlns:a16="http://schemas.microsoft.com/office/drawing/2014/main" xmlns="" id="{A05565D0-E909-433C-87F8-C564FC30EF5F}"/>
+                  <a16:creationId xmlns="" xmlns:a16="http://schemas.microsoft.com/office/drawing/2014/main" id="{A05565D0-E909-433C-87F8-C564FC30EF5F}"/>
                 </a:ext>
               </a:extLst>
             </p:cNvPr>
@@ -13053,7 +13008,7 @@
             <p:cNvPr id="790" name="Straight Arrow Connector 789">
               <a:extLst>
                 <a:ext uri="{FF2B5EF4-FFF2-40B4-BE49-F238E27FC236}">
-                  <a16:creationId xmlns:a16="http://schemas.microsoft.com/office/drawing/2014/main" xmlns="" id="{39916E2E-195A-4DC8-B025-B05FA87E6796}"/>
+                  <a16:creationId xmlns="" xmlns:a16="http://schemas.microsoft.com/office/drawing/2014/main" id="{39916E2E-195A-4DC8-B025-B05FA87E6796}"/>
                 </a:ext>
               </a:extLst>
             </p:cNvPr>
@@ -13097,7 +13052,7 @@
             <p:cNvPr id="82" name="Rectangle 62">
               <a:extLst>
                 <a:ext uri="{FF2B5EF4-FFF2-40B4-BE49-F238E27FC236}">
-                  <a16:creationId xmlns:a16="http://schemas.microsoft.com/office/drawing/2014/main" xmlns="" id="{298D4E7E-EED8-491B-8A0A-5EA4EA725539}"/>
+                  <a16:creationId xmlns="" xmlns:a16="http://schemas.microsoft.com/office/drawing/2014/main" id="{298D4E7E-EED8-491B-8A0A-5EA4EA725539}"/>
                 </a:ext>
               </a:extLst>
             </p:cNvPr>
@@ -13170,7 +13125,7 @@
             <p:cNvPr id="807" name="TextBox 806">
               <a:extLst>
                 <a:ext uri="{FF2B5EF4-FFF2-40B4-BE49-F238E27FC236}">
-                  <a16:creationId xmlns:a16="http://schemas.microsoft.com/office/drawing/2014/main" xmlns="" id="{8A66125C-0A8A-4B7E-AFDE-067D51EC70EE}"/>
+                  <a16:creationId xmlns="" xmlns:a16="http://schemas.microsoft.com/office/drawing/2014/main" id="{8A66125C-0A8A-4B7E-AFDE-067D51EC70EE}"/>
                 </a:ext>
               </a:extLst>
             </p:cNvPr>
@@ -13223,7 +13178,7 @@
             <p:cNvPr id="808" name="TextBox 807">
               <a:extLst>
                 <a:ext uri="{FF2B5EF4-FFF2-40B4-BE49-F238E27FC236}">
-                  <a16:creationId xmlns:a16="http://schemas.microsoft.com/office/drawing/2014/main" xmlns="" id="{8A66125C-0A8A-4B7E-AFDE-067D51EC70EE}"/>
+                  <a16:creationId xmlns="" xmlns:a16="http://schemas.microsoft.com/office/drawing/2014/main" id="{8A66125C-0A8A-4B7E-AFDE-067D51EC70EE}"/>
                 </a:ext>
               </a:extLst>
             </p:cNvPr>
@@ -13270,7 +13225,7 @@
             <p:cNvPr id="811" name="Straight Arrow Connector 810">
               <a:extLst>
                 <a:ext uri="{FF2B5EF4-FFF2-40B4-BE49-F238E27FC236}">
-                  <a16:creationId xmlns:a16="http://schemas.microsoft.com/office/drawing/2014/main" xmlns="" id="{5A692F45-A4BC-4FF9-B3C1-7CEA15013252}"/>
+                  <a16:creationId xmlns="" xmlns:a16="http://schemas.microsoft.com/office/drawing/2014/main" id="{5A692F45-A4BC-4FF9-B3C1-7CEA15013252}"/>
                 </a:ext>
               </a:extLst>
             </p:cNvPr>
@@ -13316,7 +13271,7 @@
             <p:cNvPr id="812" name="TextBox 811">
               <a:extLst>
                 <a:ext uri="{FF2B5EF4-FFF2-40B4-BE49-F238E27FC236}">
-                  <a16:creationId xmlns:a16="http://schemas.microsoft.com/office/drawing/2014/main" xmlns="" id="{8A66125C-0A8A-4B7E-AFDE-067D51EC70EE}"/>
+                  <a16:creationId xmlns="" xmlns:a16="http://schemas.microsoft.com/office/drawing/2014/main" id="{8A66125C-0A8A-4B7E-AFDE-067D51EC70EE}"/>
                 </a:ext>
               </a:extLst>
             </p:cNvPr>
@@ -13363,7 +13318,7 @@
             <p:cNvPr id="823" name="Straight Arrow Connector 822">
               <a:extLst>
                 <a:ext uri="{FF2B5EF4-FFF2-40B4-BE49-F238E27FC236}">
-                  <a16:creationId xmlns:a16="http://schemas.microsoft.com/office/drawing/2014/main" xmlns="" id="{39916E2E-195A-4DC8-B025-B05FA87E6796}"/>
+                  <a16:creationId xmlns="" xmlns:a16="http://schemas.microsoft.com/office/drawing/2014/main" id="{39916E2E-195A-4DC8-B025-B05FA87E6796}"/>
                 </a:ext>
               </a:extLst>
             </p:cNvPr>
@@ -13452,7 +13407,7 @@
             <p:cNvPr id="3" name="Rectangle 65">
               <a:extLst>
                 <a:ext uri="{FF2B5EF4-FFF2-40B4-BE49-F238E27FC236}">
-                  <a16:creationId xmlns:a16="http://schemas.microsoft.com/office/drawing/2014/main" xmlns="" id="{2126271C-590E-4B60-8868-3D59B556D0C2}"/>
+                  <a16:creationId xmlns="" xmlns:a16="http://schemas.microsoft.com/office/drawing/2014/main" id="{2126271C-590E-4B60-8868-3D59B556D0C2}"/>
                 </a:ext>
               </a:extLst>
             </p:cNvPr>
@@ -13984,15 +13939,7 @@
                     <a:schemeClr val="bg1"/>
                   </a:solidFill>
                 </a:rPr>
-                <a:t>e</a:t>
-              </a:r>
-              <a:r>
-                <a:rPr lang="en-SG" sz="1100" dirty="0" err="1" smtClean="0">
-                  <a:solidFill>
-                    <a:schemeClr val="bg1"/>
-                  </a:solidFill>
-                </a:rPr>
-                <a:t>o:EditOrderCommand</a:t>
+                <a:t>eo:EditOrderCommand</a:t>
               </a:r>
               <a:endParaRPr lang="en-SG" sz="1100" dirty="0">
                 <a:solidFill>
@@ -14007,7 +13954,7 @@
             <p:cNvPr id="14" name="Straight Arrow Connector 13">
               <a:extLst>
                 <a:ext uri="{FF2B5EF4-FFF2-40B4-BE49-F238E27FC236}">
-                  <a16:creationId xmlns:a16="http://schemas.microsoft.com/office/drawing/2014/main" xmlns="" id="{854D9FBB-2B36-4DC9-8B58-F7F177A8E586}"/>
+                  <a16:creationId xmlns="" xmlns:a16="http://schemas.microsoft.com/office/drawing/2014/main" id="{854D9FBB-2B36-4DC9-8B58-F7F177A8E586}"/>
                 </a:ext>
               </a:extLst>
             </p:cNvPr>
@@ -14054,7 +14001,7 @@
             <p:cNvPr id="15" name="Straight Arrow Connector 14">
               <a:extLst>
                 <a:ext uri="{FF2B5EF4-FFF2-40B4-BE49-F238E27FC236}">
-                  <a16:creationId xmlns:a16="http://schemas.microsoft.com/office/drawing/2014/main" xmlns="" id="{DDEE7225-6527-47E2-9C48-DE9485DD5A4F}"/>
+                  <a16:creationId xmlns="" xmlns:a16="http://schemas.microsoft.com/office/drawing/2014/main" id="{DDEE7225-6527-47E2-9C48-DE9485DD5A4F}"/>
                 </a:ext>
               </a:extLst>
             </p:cNvPr>
@@ -14098,7 +14045,7 @@
             <p:cNvPr id="16" name="Straight Arrow Connector 15">
               <a:extLst>
                 <a:ext uri="{FF2B5EF4-FFF2-40B4-BE49-F238E27FC236}">
-                  <a16:creationId xmlns:a16="http://schemas.microsoft.com/office/drawing/2014/main" xmlns="" id="{BF9AEA9C-54D0-4CB0-AE49-51A566B69F58}"/>
+                  <a16:creationId xmlns="" xmlns:a16="http://schemas.microsoft.com/office/drawing/2014/main" id="{BF9AEA9C-54D0-4CB0-AE49-51A566B69F58}"/>
                 </a:ext>
               </a:extLst>
             </p:cNvPr>
@@ -14144,7 +14091,7 @@
             <p:cNvPr id="17" name="Rectangle 62">
               <a:extLst>
                 <a:ext uri="{FF2B5EF4-FFF2-40B4-BE49-F238E27FC236}">
-                  <a16:creationId xmlns:a16="http://schemas.microsoft.com/office/drawing/2014/main" xmlns="" id="{61FF3397-EF07-4016-8098-DAEF482C4389}"/>
+                  <a16:creationId xmlns="" xmlns:a16="http://schemas.microsoft.com/office/drawing/2014/main" id="{61FF3397-EF07-4016-8098-DAEF482C4389}"/>
                 </a:ext>
               </a:extLst>
             </p:cNvPr>
@@ -14217,7 +14164,7 @@
             <p:cNvPr id="18" name="Straight Connector 17">
               <a:extLst>
                 <a:ext uri="{FF2B5EF4-FFF2-40B4-BE49-F238E27FC236}">
-                  <a16:creationId xmlns:a16="http://schemas.microsoft.com/office/drawing/2014/main" xmlns="" id="{22D3ED81-D4BA-4011-B139-8213177BA215}"/>
+                  <a16:creationId xmlns="" xmlns:a16="http://schemas.microsoft.com/office/drawing/2014/main" id="{22D3ED81-D4BA-4011-B139-8213177BA215}"/>
                 </a:ext>
               </a:extLst>
             </p:cNvPr>
@@ -14262,7 +14209,7 @@
             <p:cNvPr id="19" name="Rectangle 18">
               <a:extLst>
                 <a:ext uri="{FF2B5EF4-FFF2-40B4-BE49-F238E27FC236}">
-                  <a16:creationId xmlns:a16="http://schemas.microsoft.com/office/drawing/2014/main" xmlns="" id="{A96B530B-5601-46A7-9B8D-33C8DDA39964}"/>
+                  <a16:creationId xmlns="" xmlns:a16="http://schemas.microsoft.com/office/drawing/2014/main" id="{A96B530B-5601-46A7-9B8D-33C8DDA39964}"/>
                 </a:ext>
               </a:extLst>
             </p:cNvPr>
@@ -14315,7 +14262,7 @@
             <p:cNvPr id="20" name="TextBox 19">
               <a:extLst>
                 <a:ext uri="{FF2B5EF4-FFF2-40B4-BE49-F238E27FC236}">
-                  <a16:creationId xmlns:a16="http://schemas.microsoft.com/office/drawing/2014/main" xmlns="" id="{95F03D45-B1FD-49BA-8758-8ED58ACA2B5C}"/>
+                  <a16:creationId xmlns="" xmlns:a16="http://schemas.microsoft.com/office/drawing/2014/main" id="{95F03D45-B1FD-49BA-8758-8ED58ACA2B5C}"/>
                 </a:ext>
               </a:extLst>
             </p:cNvPr>
@@ -14378,7 +14325,7 @@
             <p:cNvPr id="21" name="Straight Connector 20">
               <a:extLst>
                 <a:ext uri="{FF2B5EF4-FFF2-40B4-BE49-F238E27FC236}">
-                  <a16:creationId xmlns:a16="http://schemas.microsoft.com/office/drawing/2014/main" xmlns="" id="{2DA8FBC2-6B42-43C0-BBEC-CF189FD87668}"/>
+                  <a16:creationId xmlns="" xmlns:a16="http://schemas.microsoft.com/office/drawing/2014/main" id="{2DA8FBC2-6B42-43C0-BBEC-CF189FD87668}"/>
                 </a:ext>
               </a:extLst>
             </p:cNvPr>
@@ -14423,7 +14370,7 @@
             <p:cNvPr id="22" name="Rectangle 21">
               <a:extLst>
                 <a:ext uri="{FF2B5EF4-FFF2-40B4-BE49-F238E27FC236}">
-                  <a16:creationId xmlns:a16="http://schemas.microsoft.com/office/drawing/2014/main" xmlns="" id="{04305CEA-EBD1-45C9-97BE-ECFE3AC3D249}"/>
+                  <a16:creationId xmlns="" xmlns:a16="http://schemas.microsoft.com/office/drawing/2014/main" id="{04305CEA-EBD1-45C9-97BE-ECFE3AC3D249}"/>
                 </a:ext>
               </a:extLst>
             </p:cNvPr>
@@ -14476,7 +14423,7 @@
             <p:cNvPr id="23" name="TextBox 22">
               <a:extLst>
                 <a:ext uri="{FF2B5EF4-FFF2-40B4-BE49-F238E27FC236}">
-                  <a16:creationId xmlns:a16="http://schemas.microsoft.com/office/drawing/2014/main" xmlns="" id="{81B0FA7A-7734-4574-BB3A-865D46A3AB9C}"/>
+                  <a16:creationId xmlns="" xmlns:a16="http://schemas.microsoft.com/office/drawing/2014/main" id="{81B0FA7A-7734-4574-BB3A-865D46A3AB9C}"/>
                 </a:ext>
               </a:extLst>
             </p:cNvPr>
@@ -14526,7 +14473,7 @@
             <p:cNvPr id="24" name="TextBox 23">
               <a:extLst>
                 <a:ext uri="{FF2B5EF4-FFF2-40B4-BE49-F238E27FC236}">
-                  <a16:creationId xmlns:a16="http://schemas.microsoft.com/office/drawing/2014/main" xmlns="" id="{E89E7A9A-19E7-4F1A-ABAF-9356340673CC}"/>
+                  <a16:creationId xmlns="" xmlns:a16="http://schemas.microsoft.com/office/drawing/2014/main" id="{E89E7A9A-19E7-4F1A-ABAF-9356340673CC}"/>
                 </a:ext>
               </a:extLst>
             </p:cNvPr>
@@ -14576,7 +14523,7 @@
             <p:cNvPr id="25" name="Rectangle 24">
               <a:extLst>
                 <a:ext uri="{FF2B5EF4-FFF2-40B4-BE49-F238E27FC236}">
-                  <a16:creationId xmlns:a16="http://schemas.microsoft.com/office/drawing/2014/main" xmlns="" id="{12879DF9-F252-4947-8358-26D8F2FD6F25}"/>
+                  <a16:creationId xmlns="" xmlns:a16="http://schemas.microsoft.com/office/drawing/2014/main" id="{12879DF9-F252-4947-8358-26D8F2FD6F25}"/>
                 </a:ext>
               </a:extLst>
             </p:cNvPr>
@@ -14629,7 +14576,7 @@
             <p:cNvPr id="26" name="Straight Arrow Connector 25">
               <a:extLst>
                 <a:ext uri="{FF2B5EF4-FFF2-40B4-BE49-F238E27FC236}">
-                  <a16:creationId xmlns:a16="http://schemas.microsoft.com/office/drawing/2014/main" xmlns="" id="{A1426F86-A101-449E-8BB7-81C92FFDABFC}"/>
+                  <a16:creationId xmlns="" xmlns:a16="http://schemas.microsoft.com/office/drawing/2014/main" id="{A1426F86-A101-449E-8BB7-81C92FFDABFC}"/>
                 </a:ext>
               </a:extLst>
             </p:cNvPr>
@@ -14673,7 +14620,7 @@
             <p:cNvPr id="27" name="Straight Arrow Connector 26">
               <a:extLst>
                 <a:ext uri="{FF2B5EF4-FFF2-40B4-BE49-F238E27FC236}">
-                  <a16:creationId xmlns:a16="http://schemas.microsoft.com/office/drawing/2014/main" xmlns="" id="{5A692F45-A4BC-4FF9-B3C1-7CEA15013252}"/>
+                  <a16:creationId xmlns="" xmlns:a16="http://schemas.microsoft.com/office/drawing/2014/main" id="{5A692F45-A4BC-4FF9-B3C1-7CEA15013252}"/>
                 </a:ext>
               </a:extLst>
             </p:cNvPr>
@@ -14719,7 +14666,7 @@
             <p:cNvPr id="28" name="Straight Arrow Connector 27">
               <a:extLst>
                 <a:ext uri="{FF2B5EF4-FFF2-40B4-BE49-F238E27FC236}">
-                  <a16:creationId xmlns:a16="http://schemas.microsoft.com/office/drawing/2014/main" xmlns="" id="{F316D50F-9AF5-45BB-A814-DED5EA02E797}"/>
+                  <a16:creationId xmlns="" xmlns:a16="http://schemas.microsoft.com/office/drawing/2014/main" id="{F316D50F-9AF5-45BB-A814-DED5EA02E797}"/>
                 </a:ext>
               </a:extLst>
             </p:cNvPr>
@@ -14763,7 +14710,7 @@
             <p:cNvPr id="29" name="Straight Arrow Connector 28">
               <a:extLst>
                 <a:ext uri="{FF2B5EF4-FFF2-40B4-BE49-F238E27FC236}">
-                  <a16:creationId xmlns:a16="http://schemas.microsoft.com/office/drawing/2014/main" xmlns="" id="{0C2EB6B9-B95A-43BC-861F-54F7C85EECD7}"/>
+                  <a16:creationId xmlns="" xmlns:a16="http://schemas.microsoft.com/office/drawing/2014/main" id="{0C2EB6B9-B95A-43BC-861F-54F7C85EECD7}"/>
                 </a:ext>
               </a:extLst>
             </p:cNvPr>
@@ -14809,7 +14756,7 @@
             <p:cNvPr id="30" name="Rectangle 62">
               <a:extLst>
                 <a:ext uri="{FF2B5EF4-FFF2-40B4-BE49-F238E27FC236}">
-                  <a16:creationId xmlns:a16="http://schemas.microsoft.com/office/drawing/2014/main" xmlns="" id="{298D4E7E-EED8-491B-8A0A-5EA4EA725539}"/>
+                  <a16:creationId xmlns="" xmlns:a16="http://schemas.microsoft.com/office/drawing/2014/main" id="{298D4E7E-EED8-491B-8A0A-5EA4EA725539}"/>
                 </a:ext>
               </a:extLst>
             </p:cNvPr>
@@ -14882,7 +14829,7 @@
             <p:cNvPr id="31" name="TextBox 30">
               <a:extLst>
                 <a:ext uri="{FF2B5EF4-FFF2-40B4-BE49-F238E27FC236}">
-                  <a16:creationId xmlns:a16="http://schemas.microsoft.com/office/drawing/2014/main" xmlns="" id="{8A66125C-0A8A-4B7E-AFDE-067D51EC70EE}"/>
+                  <a16:creationId xmlns="" xmlns:a16="http://schemas.microsoft.com/office/drawing/2014/main" id="{8A66125C-0A8A-4B7E-AFDE-067D51EC70EE}"/>
                 </a:ext>
               </a:extLst>
             </p:cNvPr>
@@ -14918,11 +14865,7 @@
             <a:p>
               <a:r>
                 <a:rPr lang="en-US" sz="1100" dirty="0" err="1" smtClean="0"/>
-                <a:t>Edit</a:t>
-              </a:r>
-              <a:r>
-                <a:rPr lang="en-US" sz="1100" dirty="0" err="1" smtClean="0"/>
-                <a:t>Order</a:t>
+                <a:t>EditOrder</a:t>
               </a:r>
               <a:endParaRPr lang="en-US" sz="1100" dirty="0"/>
             </a:p>
@@ -14940,7 +14883,7 @@
             <p:cNvPr id="32" name="Rectangle 31">
               <a:extLst>
                 <a:ext uri="{FF2B5EF4-FFF2-40B4-BE49-F238E27FC236}">
-                  <a16:creationId xmlns:a16="http://schemas.microsoft.com/office/drawing/2014/main" xmlns="" id="{22D2FCA0-7BE2-46D8-B8D6-DE64A1E34A9F}"/>
+                  <a16:creationId xmlns="" xmlns:a16="http://schemas.microsoft.com/office/drawing/2014/main" id="{22D2FCA0-7BE2-46D8-B8D6-DE64A1E34A9F}"/>
                 </a:ext>
               </a:extLst>
             </p:cNvPr>
@@ -14993,7 +14936,7 @@
             <p:cNvPr id="33" name="Straight Arrow Connector 32">
               <a:extLst>
                 <a:ext uri="{FF2B5EF4-FFF2-40B4-BE49-F238E27FC236}">
-                  <a16:creationId xmlns:a16="http://schemas.microsoft.com/office/drawing/2014/main" xmlns="" id="{9FF4C9C2-8F37-4F5A-A44E-ACB1B565C80F}"/>
+                  <a16:creationId xmlns="" xmlns:a16="http://schemas.microsoft.com/office/drawing/2014/main" id="{9FF4C9C2-8F37-4F5A-A44E-ACB1B565C80F}"/>
                 </a:ext>
               </a:extLst>
             </p:cNvPr>
@@ -15039,7 +14982,7 @@
             <p:cNvPr id="34" name="TextBox 33">
               <a:extLst>
                 <a:ext uri="{FF2B5EF4-FFF2-40B4-BE49-F238E27FC236}">
-                  <a16:creationId xmlns:a16="http://schemas.microsoft.com/office/drawing/2014/main" xmlns="" id="{CAF6EAA2-E1B3-4146-9FD1-EED02820840E}"/>
+                  <a16:creationId xmlns="" xmlns:a16="http://schemas.microsoft.com/office/drawing/2014/main" id="{CAF6EAA2-E1B3-4146-9FD1-EED02820840E}"/>
                 </a:ext>
               </a:extLst>
             </p:cNvPr>
@@ -15078,7 +15021,7 @@
             <p:cNvPr id="35" name="Straight Arrow Connector 34">
               <a:extLst>
                 <a:ext uri="{FF2B5EF4-FFF2-40B4-BE49-F238E27FC236}">
-                  <a16:creationId xmlns:a16="http://schemas.microsoft.com/office/drawing/2014/main" xmlns="" id="{3DB62E95-D983-49BD-93B5-D53F5ED931D4}"/>
+                  <a16:creationId xmlns="" xmlns:a16="http://schemas.microsoft.com/office/drawing/2014/main" id="{3DB62E95-D983-49BD-93B5-D53F5ED931D4}"/>
                 </a:ext>
               </a:extLst>
             </p:cNvPr>
@@ -15122,7 +15065,7 @@
             <p:cNvPr id="36" name="TextBox 35">
               <a:extLst>
                 <a:ext uri="{FF2B5EF4-FFF2-40B4-BE49-F238E27FC236}">
-                  <a16:creationId xmlns:a16="http://schemas.microsoft.com/office/drawing/2014/main" xmlns="" id="{0C0656C6-C19E-4524-AFA8-7C3E64F61000}"/>
+                  <a16:creationId xmlns="" xmlns:a16="http://schemas.microsoft.com/office/drawing/2014/main" id="{0C0656C6-C19E-4524-AFA8-7C3E64F61000}"/>
                 </a:ext>
               </a:extLst>
             </p:cNvPr>
@@ -15168,7 +15111,7 @@
             <p:cNvPr id="37" name="TextBox 36">
               <a:extLst>
                 <a:ext uri="{FF2B5EF4-FFF2-40B4-BE49-F238E27FC236}">
-                  <a16:creationId xmlns:a16="http://schemas.microsoft.com/office/drawing/2014/main" xmlns="" id="{89829A4E-2BD6-44C2-95D7-541B8F82E923}"/>
+                  <a16:creationId xmlns="" xmlns:a16="http://schemas.microsoft.com/office/drawing/2014/main" id="{89829A4E-2BD6-44C2-95D7-541B8F82E923}"/>
                 </a:ext>
               </a:extLst>
             </p:cNvPr>
@@ -15252,7 +15195,7 @@
             <p:cNvPr id="39" name="Rectangle 62">
               <a:extLst>
                 <a:ext uri="{FF2B5EF4-FFF2-40B4-BE49-F238E27FC236}">
-                  <a16:creationId xmlns:a16="http://schemas.microsoft.com/office/drawing/2014/main" xmlns="" id="{298D4E7E-EED8-491B-8A0A-5EA4EA725539}"/>
+                  <a16:creationId xmlns="" xmlns:a16="http://schemas.microsoft.com/office/drawing/2014/main" id="{298D4E7E-EED8-491B-8A0A-5EA4EA725539}"/>
                 </a:ext>
               </a:extLst>
             </p:cNvPr>
@@ -15356,7 +15299,7 @@
             <p:cNvPr id="41" name="Rectangle 40">
               <a:extLst>
                 <a:ext uri="{FF2B5EF4-FFF2-40B4-BE49-F238E27FC236}">
-                  <a16:creationId xmlns:a16="http://schemas.microsoft.com/office/drawing/2014/main" xmlns="" id="{22D2FCA0-7BE2-46D8-B8D6-DE64A1E34A9F}"/>
+                  <a16:creationId xmlns="" xmlns:a16="http://schemas.microsoft.com/office/drawing/2014/main" id="{22D2FCA0-7BE2-46D8-B8D6-DE64A1E34A9F}"/>
                 </a:ext>
               </a:extLst>
             </p:cNvPr>
@@ -15409,7 +15352,7 @@
             <p:cNvPr id="42" name="Straight Arrow Connector 41">
               <a:extLst>
                 <a:ext uri="{FF2B5EF4-FFF2-40B4-BE49-F238E27FC236}">
-                  <a16:creationId xmlns:a16="http://schemas.microsoft.com/office/drawing/2014/main" xmlns="" id="{22607DA0-7EBB-4D04-93AE-CFD259F847D9}"/>
+                  <a16:creationId xmlns="" xmlns:a16="http://schemas.microsoft.com/office/drawing/2014/main" id="{22607DA0-7EBB-4D04-93AE-CFD259F847D9}"/>
                 </a:ext>
               </a:extLst>
             </p:cNvPr>
@@ -15502,7 +15445,7 @@
             <p:cNvPr id="44" name="Straight Arrow Connector 43">
               <a:extLst>
                 <a:ext uri="{FF2B5EF4-FFF2-40B4-BE49-F238E27FC236}">
-                  <a16:creationId xmlns:a16="http://schemas.microsoft.com/office/drawing/2014/main" xmlns="" id="{9FF4C9C2-8F37-4F5A-A44E-ACB1B565C80F}"/>
+                  <a16:creationId xmlns="" xmlns:a16="http://schemas.microsoft.com/office/drawing/2014/main" id="{9FF4C9C2-8F37-4F5A-A44E-ACB1B565C80F}"/>
                 </a:ext>
               </a:extLst>
             </p:cNvPr>
@@ -15548,7 +15491,7 @@
             <p:cNvPr id="45" name="Rectangle 62">
               <a:extLst>
                 <a:ext uri="{FF2B5EF4-FFF2-40B4-BE49-F238E27FC236}">
-                  <a16:creationId xmlns:a16="http://schemas.microsoft.com/office/drawing/2014/main" xmlns="" id="{298D4E7E-EED8-491B-8A0A-5EA4EA725539}"/>
+                  <a16:creationId xmlns="" xmlns:a16="http://schemas.microsoft.com/office/drawing/2014/main" id="{298D4E7E-EED8-491B-8A0A-5EA4EA725539}"/>
                 </a:ext>
               </a:extLst>
             </p:cNvPr>
@@ -15624,7 +15567,7 @@
             <p:cNvPr id="46" name="Straight Arrow Connector 45">
               <a:extLst>
                 <a:ext uri="{FF2B5EF4-FFF2-40B4-BE49-F238E27FC236}">
-                  <a16:creationId xmlns:a16="http://schemas.microsoft.com/office/drawing/2014/main" xmlns="" id="{39916E2E-195A-4DC8-B025-B05FA87E6796}"/>
+                  <a16:creationId xmlns="" xmlns:a16="http://schemas.microsoft.com/office/drawing/2014/main" id="{39916E2E-195A-4DC8-B025-B05FA87E6796}"/>
                 </a:ext>
               </a:extLst>
             </p:cNvPr>
@@ -15754,7 +15697,7 @@
             <p:cNvPr id="49" name="Rectangle 48">
               <a:extLst>
                 <a:ext uri="{FF2B5EF4-FFF2-40B4-BE49-F238E27FC236}">
-                  <a16:creationId xmlns:a16="http://schemas.microsoft.com/office/drawing/2014/main" xmlns="" id="{12879DF9-F252-4947-8358-26D8F2FD6F25}"/>
+                  <a16:creationId xmlns="" xmlns:a16="http://schemas.microsoft.com/office/drawing/2014/main" id="{12879DF9-F252-4947-8358-26D8F2FD6F25}"/>
                 </a:ext>
               </a:extLst>
             </p:cNvPr>
@@ -15807,7 +15750,7 @@
             <p:cNvPr id="50" name="Straight Arrow Connector 49">
               <a:extLst>
                 <a:ext uri="{FF2B5EF4-FFF2-40B4-BE49-F238E27FC236}">
-                  <a16:creationId xmlns:a16="http://schemas.microsoft.com/office/drawing/2014/main" xmlns="" id="{5A692F45-A4BC-4FF9-B3C1-7CEA15013252}"/>
+                  <a16:creationId xmlns="" xmlns:a16="http://schemas.microsoft.com/office/drawing/2014/main" id="{5A692F45-A4BC-4FF9-B3C1-7CEA15013252}"/>
                 </a:ext>
               </a:extLst>
             </p:cNvPr>
@@ -15893,7 +15836,7 @@
             <p:cNvPr id="52" name="Rectangle 62">
               <a:extLst>
                 <a:ext uri="{FF2B5EF4-FFF2-40B4-BE49-F238E27FC236}">
-                  <a16:creationId xmlns:a16="http://schemas.microsoft.com/office/drawing/2014/main" xmlns="" id="{A05565D0-E909-433C-87F8-C564FC30EF5F}"/>
+                  <a16:creationId xmlns="" xmlns:a16="http://schemas.microsoft.com/office/drawing/2014/main" id="{A05565D0-E909-433C-87F8-C564FC30EF5F}"/>
                 </a:ext>
               </a:extLst>
             </p:cNvPr>
@@ -15958,7 +15901,7 @@
             <p:cNvPr id="53" name="Straight Arrow Connector 52">
               <a:extLst>
                 <a:ext uri="{FF2B5EF4-FFF2-40B4-BE49-F238E27FC236}">
-                  <a16:creationId xmlns:a16="http://schemas.microsoft.com/office/drawing/2014/main" xmlns="" id="{39916E2E-195A-4DC8-B025-B05FA87E6796}"/>
+                  <a16:creationId xmlns="" xmlns:a16="http://schemas.microsoft.com/office/drawing/2014/main" id="{39916E2E-195A-4DC8-B025-B05FA87E6796}"/>
                 </a:ext>
               </a:extLst>
             </p:cNvPr>
@@ -16002,7 +15945,7 @@
             <p:cNvPr id="54" name="Rectangle 62">
               <a:extLst>
                 <a:ext uri="{FF2B5EF4-FFF2-40B4-BE49-F238E27FC236}">
-                  <a16:creationId xmlns:a16="http://schemas.microsoft.com/office/drawing/2014/main" xmlns="" id="{298D4E7E-EED8-491B-8A0A-5EA4EA725539}"/>
+                  <a16:creationId xmlns="" xmlns:a16="http://schemas.microsoft.com/office/drawing/2014/main" id="{298D4E7E-EED8-491B-8A0A-5EA4EA725539}"/>
                 </a:ext>
               </a:extLst>
             </p:cNvPr>
@@ -16075,7 +16018,7 @@
             <p:cNvPr id="55" name="TextBox 54">
               <a:extLst>
                 <a:ext uri="{FF2B5EF4-FFF2-40B4-BE49-F238E27FC236}">
-                  <a16:creationId xmlns:a16="http://schemas.microsoft.com/office/drawing/2014/main" xmlns="" id="{8A66125C-0A8A-4B7E-AFDE-067D51EC70EE}"/>
+                  <a16:creationId xmlns="" xmlns:a16="http://schemas.microsoft.com/office/drawing/2014/main" id="{8A66125C-0A8A-4B7E-AFDE-067D51EC70EE}"/>
                 </a:ext>
               </a:extLst>
             </p:cNvPr>
@@ -16128,7 +16071,7 @@
             <p:cNvPr id="56" name="TextBox 55">
               <a:extLst>
                 <a:ext uri="{FF2B5EF4-FFF2-40B4-BE49-F238E27FC236}">
-                  <a16:creationId xmlns:a16="http://schemas.microsoft.com/office/drawing/2014/main" xmlns="" id="{8A66125C-0A8A-4B7E-AFDE-067D51EC70EE}"/>
+                  <a16:creationId xmlns="" xmlns:a16="http://schemas.microsoft.com/office/drawing/2014/main" id="{8A66125C-0A8A-4B7E-AFDE-067D51EC70EE}"/>
                 </a:ext>
               </a:extLst>
             </p:cNvPr>
@@ -16175,7 +16118,7 @@
             <p:cNvPr id="57" name="Straight Arrow Connector 56">
               <a:extLst>
                 <a:ext uri="{FF2B5EF4-FFF2-40B4-BE49-F238E27FC236}">
-                  <a16:creationId xmlns:a16="http://schemas.microsoft.com/office/drawing/2014/main" xmlns="" id="{5A692F45-A4BC-4FF9-B3C1-7CEA15013252}"/>
+                  <a16:creationId xmlns="" xmlns:a16="http://schemas.microsoft.com/office/drawing/2014/main" id="{5A692F45-A4BC-4FF9-B3C1-7CEA15013252}"/>
                 </a:ext>
               </a:extLst>
             </p:cNvPr>
@@ -16221,7 +16164,7 @@
             <p:cNvPr id="58" name="TextBox 57">
               <a:extLst>
                 <a:ext uri="{FF2B5EF4-FFF2-40B4-BE49-F238E27FC236}">
-                  <a16:creationId xmlns:a16="http://schemas.microsoft.com/office/drawing/2014/main" xmlns="" id="{8A66125C-0A8A-4B7E-AFDE-067D51EC70EE}"/>
+                  <a16:creationId xmlns="" xmlns:a16="http://schemas.microsoft.com/office/drawing/2014/main" id="{8A66125C-0A8A-4B7E-AFDE-067D51EC70EE}"/>
                 </a:ext>
               </a:extLst>
             </p:cNvPr>
@@ -16272,7 +16215,7 @@
             <p:cNvPr id="59" name="Straight Arrow Connector 58">
               <a:extLst>
                 <a:ext uri="{FF2B5EF4-FFF2-40B4-BE49-F238E27FC236}">
-                  <a16:creationId xmlns:a16="http://schemas.microsoft.com/office/drawing/2014/main" xmlns="" id="{39916E2E-195A-4DC8-B025-B05FA87E6796}"/>
+                  <a16:creationId xmlns="" xmlns:a16="http://schemas.microsoft.com/office/drawing/2014/main" id="{39916E2E-195A-4DC8-B025-B05FA87E6796}"/>
                 </a:ext>
               </a:extLst>
             </p:cNvPr>
@@ -16361,7 +16304,7 @@
             <p:cNvPr id="61" name="Rectangle 65">
               <a:extLst>
                 <a:ext uri="{FF2B5EF4-FFF2-40B4-BE49-F238E27FC236}">
-                  <a16:creationId xmlns:a16="http://schemas.microsoft.com/office/drawing/2014/main" xmlns="" id="{2126271C-590E-4B60-8868-3D59B556D0C2}"/>
+                  <a16:creationId xmlns="" xmlns:a16="http://schemas.microsoft.com/office/drawing/2014/main" id="{2126271C-590E-4B60-8868-3D59B556D0C2}"/>
                 </a:ext>
               </a:extLst>
             </p:cNvPr>
@@ -16616,11 +16559,7 @@
             <a:p>
               <a:r>
                 <a:rPr lang="en-US" sz="1100" dirty="0" smtClean="0"/>
-                <a:t>Status</a:t>
-              </a:r>
-              <a:r>
-                <a:rPr lang="en-US" sz="1100" dirty="0" smtClean="0"/>
-                <a:t>(o)</a:t>
+                <a:t>Status(o)</a:t>
               </a:r>
               <a:endParaRPr lang="en-US" sz="1100" dirty="0"/>
             </a:p>
@@ -16915,7 +16854,7 @@
             <p:cNvPr id="72" name="Straight Arrow Connector 71">
               <a:extLst>
                 <a:ext uri="{FF2B5EF4-FFF2-40B4-BE49-F238E27FC236}">
-                  <a16:creationId xmlns:a16="http://schemas.microsoft.com/office/drawing/2014/main" xmlns="" id="{854D9FBB-2B36-4DC9-8B58-F7F177A8E586}"/>
+                  <a16:creationId xmlns="" xmlns:a16="http://schemas.microsoft.com/office/drawing/2014/main" id="{854D9FBB-2B36-4DC9-8B58-F7F177A8E586}"/>
                 </a:ext>
               </a:extLst>
             </p:cNvPr>
@@ -16962,7 +16901,7 @@
             <p:cNvPr id="73" name="Straight Arrow Connector 72">
               <a:extLst>
                 <a:ext uri="{FF2B5EF4-FFF2-40B4-BE49-F238E27FC236}">
-                  <a16:creationId xmlns:a16="http://schemas.microsoft.com/office/drawing/2014/main" xmlns="" id="{DDEE7225-6527-47E2-9C48-DE9485DD5A4F}"/>
+                  <a16:creationId xmlns="" xmlns:a16="http://schemas.microsoft.com/office/drawing/2014/main" id="{DDEE7225-6527-47E2-9C48-DE9485DD5A4F}"/>
                 </a:ext>
               </a:extLst>
             </p:cNvPr>
@@ -17006,7 +16945,7 @@
             <p:cNvPr id="74" name="Straight Arrow Connector 73">
               <a:extLst>
                 <a:ext uri="{FF2B5EF4-FFF2-40B4-BE49-F238E27FC236}">
-                  <a16:creationId xmlns:a16="http://schemas.microsoft.com/office/drawing/2014/main" xmlns="" id="{BF9AEA9C-54D0-4CB0-AE49-51A566B69F58}"/>
+                  <a16:creationId xmlns="" xmlns:a16="http://schemas.microsoft.com/office/drawing/2014/main" id="{BF9AEA9C-54D0-4CB0-AE49-51A566B69F58}"/>
                 </a:ext>
               </a:extLst>
             </p:cNvPr>
@@ -17052,7 +16991,7 @@
             <p:cNvPr id="75" name="Rectangle 62">
               <a:extLst>
                 <a:ext uri="{FF2B5EF4-FFF2-40B4-BE49-F238E27FC236}">
-                  <a16:creationId xmlns:a16="http://schemas.microsoft.com/office/drawing/2014/main" xmlns="" id="{61FF3397-EF07-4016-8098-DAEF482C4389}"/>
+                  <a16:creationId xmlns="" xmlns:a16="http://schemas.microsoft.com/office/drawing/2014/main" id="{61FF3397-EF07-4016-8098-DAEF482C4389}"/>
                 </a:ext>
               </a:extLst>
             </p:cNvPr>
@@ -17125,7 +17064,7 @@
             <p:cNvPr id="76" name="Straight Connector 75">
               <a:extLst>
                 <a:ext uri="{FF2B5EF4-FFF2-40B4-BE49-F238E27FC236}">
-                  <a16:creationId xmlns:a16="http://schemas.microsoft.com/office/drawing/2014/main" xmlns="" id="{22D3ED81-D4BA-4011-B139-8213177BA215}"/>
+                  <a16:creationId xmlns="" xmlns:a16="http://schemas.microsoft.com/office/drawing/2014/main" id="{22D3ED81-D4BA-4011-B139-8213177BA215}"/>
                 </a:ext>
               </a:extLst>
             </p:cNvPr>
@@ -17170,7 +17109,7 @@
             <p:cNvPr id="77" name="Rectangle 76">
               <a:extLst>
                 <a:ext uri="{FF2B5EF4-FFF2-40B4-BE49-F238E27FC236}">
-                  <a16:creationId xmlns:a16="http://schemas.microsoft.com/office/drawing/2014/main" xmlns="" id="{A96B530B-5601-46A7-9B8D-33C8DDA39964}"/>
+                  <a16:creationId xmlns="" xmlns:a16="http://schemas.microsoft.com/office/drawing/2014/main" id="{A96B530B-5601-46A7-9B8D-33C8DDA39964}"/>
                 </a:ext>
               </a:extLst>
             </p:cNvPr>
@@ -17223,7 +17162,7 @@
             <p:cNvPr id="78" name="TextBox 77">
               <a:extLst>
                 <a:ext uri="{FF2B5EF4-FFF2-40B4-BE49-F238E27FC236}">
-                  <a16:creationId xmlns:a16="http://schemas.microsoft.com/office/drawing/2014/main" xmlns="" id="{95F03D45-B1FD-49BA-8758-8ED58ACA2B5C}"/>
+                  <a16:creationId xmlns="" xmlns:a16="http://schemas.microsoft.com/office/drawing/2014/main" id="{95F03D45-B1FD-49BA-8758-8ED58ACA2B5C}"/>
                 </a:ext>
               </a:extLst>
             </p:cNvPr>
@@ -17286,7 +17225,7 @@
             <p:cNvPr id="79" name="Straight Connector 78">
               <a:extLst>
                 <a:ext uri="{FF2B5EF4-FFF2-40B4-BE49-F238E27FC236}">
-                  <a16:creationId xmlns:a16="http://schemas.microsoft.com/office/drawing/2014/main" xmlns="" id="{2DA8FBC2-6B42-43C0-BBEC-CF189FD87668}"/>
+                  <a16:creationId xmlns="" xmlns:a16="http://schemas.microsoft.com/office/drawing/2014/main" id="{2DA8FBC2-6B42-43C0-BBEC-CF189FD87668}"/>
                 </a:ext>
               </a:extLst>
             </p:cNvPr>
@@ -17331,7 +17270,7 @@
             <p:cNvPr id="80" name="Rectangle 79">
               <a:extLst>
                 <a:ext uri="{FF2B5EF4-FFF2-40B4-BE49-F238E27FC236}">
-                  <a16:creationId xmlns:a16="http://schemas.microsoft.com/office/drawing/2014/main" xmlns="" id="{04305CEA-EBD1-45C9-97BE-ECFE3AC3D249}"/>
+                  <a16:creationId xmlns="" xmlns:a16="http://schemas.microsoft.com/office/drawing/2014/main" id="{04305CEA-EBD1-45C9-97BE-ECFE3AC3D249}"/>
                 </a:ext>
               </a:extLst>
             </p:cNvPr>
@@ -17384,7 +17323,7 @@
             <p:cNvPr id="81" name="TextBox 80">
               <a:extLst>
                 <a:ext uri="{FF2B5EF4-FFF2-40B4-BE49-F238E27FC236}">
-                  <a16:creationId xmlns:a16="http://schemas.microsoft.com/office/drawing/2014/main" xmlns="" id="{81B0FA7A-7734-4574-BB3A-865D46A3AB9C}"/>
+                  <a16:creationId xmlns="" xmlns:a16="http://schemas.microsoft.com/office/drawing/2014/main" id="{81B0FA7A-7734-4574-BB3A-865D46A3AB9C}"/>
                 </a:ext>
               </a:extLst>
             </p:cNvPr>
@@ -17434,7 +17373,7 @@
             <p:cNvPr id="82" name="TextBox 81">
               <a:extLst>
                 <a:ext uri="{FF2B5EF4-FFF2-40B4-BE49-F238E27FC236}">
-                  <a16:creationId xmlns:a16="http://schemas.microsoft.com/office/drawing/2014/main" xmlns="" id="{E89E7A9A-19E7-4F1A-ABAF-9356340673CC}"/>
+                  <a16:creationId xmlns="" xmlns:a16="http://schemas.microsoft.com/office/drawing/2014/main" id="{E89E7A9A-19E7-4F1A-ABAF-9356340673CC}"/>
                 </a:ext>
               </a:extLst>
             </p:cNvPr>
@@ -17484,7 +17423,7 @@
             <p:cNvPr id="83" name="Rectangle 82">
               <a:extLst>
                 <a:ext uri="{FF2B5EF4-FFF2-40B4-BE49-F238E27FC236}">
-                  <a16:creationId xmlns:a16="http://schemas.microsoft.com/office/drawing/2014/main" xmlns="" id="{12879DF9-F252-4947-8358-26D8F2FD6F25}"/>
+                  <a16:creationId xmlns="" xmlns:a16="http://schemas.microsoft.com/office/drawing/2014/main" id="{12879DF9-F252-4947-8358-26D8F2FD6F25}"/>
                 </a:ext>
               </a:extLst>
             </p:cNvPr>
@@ -17537,7 +17476,7 @@
             <p:cNvPr id="84" name="Straight Arrow Connector 83">
               <a:extLst>
                 <a:ext uri="{FF2B5EF4-FFF2-40B4-BE49-F238E27FC236}">
-                  <a16:creationId xmlns:a16="http://schemas.microsoft.com/office/drawing/2014/main" xmlns="" id="{A1426F86-A101-449E-8BB7-81C92FFDABFC}"/>
+                  <a16:creationId xmlns="" xmlns:a16="http://schemas.microsoft.com/office/drawing/2014/main" id="{A1426F86-A101-449E-8BB7-81C92FFDABFC}"/>
                 </a:ext>
               </a:extLst>
             </p:cNvPr>
@@ -17581,7 +17520,7 @@
             <p:cNvPr id="85" name="Straight Arrow Connector 84">
               <a:extLst>
                 <a:ext uri="{FF2B5EF4-FFF2-40B4-BE49-F238E27FC236}">
-                  <a16:creationId xmlns:a16="http://schemas.microsoft.com/office/drawing/2014/main" xmlns="" id="{5A692F45-A4BC-4FF9-B3C1-7CEA15013252}"/>
+                  <a16:creationId xmlns="" xmlns:a16="http://schemas.microsoft.com/office/drawing/2014/main" id="{5A692F45-A4BC-4FF9-B3C1-7CEA15013252}"/>
                 </a:ext>
               </a:extLst>
             </p:cNvPr>
@@ -17627,7 +17566,7 @@
             <p:cNvPr id="86" name="Straight Arrow Connector 85">
               <a:extLst>
                 <a:ext uri="{FF2B5EF4-FFF2-40B4-BE49-F238E27FC236}">
-                  <a16:creationId xmlns:a16="http://schemas.microsoft.com/office/drawing/2014/main" xmlns="" id="{F316D50F-9AF5-45BB-A814-DED5EA02E797}"/>
+                  <a16:creationId xmlns="" xmlns:a16="http://schemas.microsoft.com/office/drawing/2014/main" id="{F316D50F-9AF5-45BB-A814-DED5EA02E797}"/>
                 </a:ext>
               </a:extLst>
             </p:cNvPr>
@@ -17671,7 +17610,7 @@
             <p:cNvPr id="87" name="Straight Arrow Connector 86">
               <a:extLst>
                 <a:ext uri="{FF2B5EF4-FFF2-40B4-BE49-F238E27FC236}">
-                  <a16:creationId xmlns:a16="http://schemas.microsoft.com/office/drawing/2014/main" xmlns="" id="{0C2EB6B9-B95A-43BC-861F-54F7C85EECD7}"/>
+                  <a16:creationId xmlns="" xmlns:a16="http://schemas.microsoft.com/office/drawing/2014/main" id="{0C2EB6B9-B95A-43BC-861F-54F7C85EECD7}"/>
                 </a:ext>
               </a:extLst>
             </p:cNvPr>
@@ -17717,7 +17656,7 @@
             <p:cNvPr id="88" name="Rectangle 62">
               <a:extLst>
                 <a:ext uri="{FF2B5EF4-FFF2-40B4-BE49-F238E27FC236}">
-                  <a16:creationId xmlns:a16="http://schemas.microsoft.com/office/drawing/2014/main" xmlns="" id="{298D4E7E-EED8-491B-8A0A-5EA4EA725539}"/>
+                  <a16:creationId xmlns="" xmlns:a16="http://schemas.microsoft.com/office/drawing/2014/main" id="{298D4E7E-EED8-491B-8A0A-5EA4EA725539}"/>
                 </a:ext>
               </a:extLst>
             </p:cNvPr>
@@ -17790,7 +17729,7 @@
             <p:cNvPr id="89" name="TextBox 88">
               <a:extLst>
                 <a:ext uri="{FF2B5EF4-FFF2-40B4-BE49-F238E27FC236}">
-                  <a16:creationId xmlns:a16="http://schemas.microsoft.com/office/drawing/2014/main" xmlns="" id="{8A66125C-0A8A-4B7E-AFDE-067D51EC70EE}"/>
+                  <a16:creationId xmlns="" xmlns:a16="http://schemas.microsoft.com/office/drawing/2014/main" id="{8A66125C-0A8A-4B7E-AFDE-067D51EC70EE}"/>
                 </a:ext>
               </a:extLst>
             </p:cNvPr>
@@ -17848,7 +17787,7 @@
             <p:cNvPr id="90" name="Rectangle 89">
               <a:extLst>
                 <a:ext uri="{FF2B5EF4-FFF2-40B4-BE49-F238E27FC236}">
-                  <a16:creationId xmlns:a16="http://schemas.microsoft.com/office/drawing/2014/main" xmlns="" id="{22D2FCA0-7BE2-46D8-B8D6-DE64A1E34A9F}"/>
+                  <a16:creationId xmlns="" xmlns:a16="http://schemas.microsoft.com/office/drawing/2014/main" id="{22D2FCA0-7BE2-46D8-B8D6-DE64A1E34A9F}"/>
                 </a:ext>
               </a:extLst>
             </p:cNvPr>
@@ -17901,7 +17840,7 @@
             <p:cNvPr id="91" name="Straight Arrow Connector 90">
               <a:extLst>
                 <a:ext uri="{FF2B5EF4-FFF2-40B4-BE49-F238E27FC236}">
-                  <a16:creationId xmlns:a16="http://schemas.microsoft.com/office/drawing/2014/main" xmlns="" id="{9FF4C9C2-8F37-4F5A-A44E-ACB1B565C80F}"/>
+                  <a16:creationId xmlns="" xmlns:a16="http://schemas.microsoft.com/office/drawing/2014/main" id="{9FF4C9C2-8F37-4F5A-A44E-ACB1B565C80F}"/>
                 </a:ext>
               </a:extLst>
             </p:cNvPr>
@@ -17947,7 +17886,7 @@
             <p:cNvPr id="92" name="TextBox 91">
               <a:extLst>
                 <a:ext uri="{FF2B5EF4-FFF2-40B4-BE49-F238E27FC236}">
-                  <a16:creationId xmlns:a16="http://schemas.microsoft.com/office/drawing/2014/main" xmlns="" id="{CAF6EAA2-E1B3-4146-9FD1-EED02820840E}"/>
+                  <a16:creationId xmlns="" xmlns:a16="http://schemas.microsoft.com/office/drawing/2014/main" id="{CAF6EAA2-E1B3-4146-9FD1-EED02820840E}"/>
                 </a:ext>
               </a:extLst>
             </p:cNvPr>
@@ -17986,7 +17925,7 @@
             <p:cNvPr id="93" name="Straight Arrow Connector 92">
               <a:extLst>
                 <a:ext uri="{FF2B5EF4-FFF2-40B4-BE49-F238E27FC236}">
-                  <a16:creationId xmlns:a16="http://schemas.microsoft.com/office/drawing/2014/main" xmlns="" id="{3DB62E95-D983-49BD-93B5-D53F5ED931D4}"/>
+                  <a16:creationId xmlns="" xmlns:a16="http://schemas.microsoft.com/office/drawing/2014/main" id="{3DB62E95-D983-49BD-93B5-D53F5ED931D4}"/>
                 </a:ext>
               </a:extLst>
             </p:cNvPr>
@@ -18030,7 +17969,7 @@
             <p:cNvPr id="94" name="TextBox 93">
               <a:extLst>
                 <a:ext uri="{FF2B5EF4-FFF2-40B4-BE49-F238E27FC236}">
-                  <a16:creationId xmlns:a16="http://schemas.microsoft.com/office/drawing/2014/main" xmlns="" id="{0C0656C6-C19E-4524-AFA8-7C3E64F61000}"/>
+                  <a16:creationId xmlns="" xmlns:a16="http://schemas.microsoft.com/office/drawing/2014/main" id="{0C0656C6-C19E-4524-AFA8-7C3E64F61000}"/>
                 </a:ext>
               </a:extLst>
             </p:cNvPr>
@@ -18076,7 +18015,7 @@
             <p:cNvPr id="95" name="TextBox 94">
               <a:extLst>
                 <a:ext uri="{FF2B5EF4-FFF2-40B4-BE49-F238E27FC236}">
-                  <a16:creationId xmlns:a16="http://schemas.microsoft.com/office/drawing/2014/main" xmlns="" id="{89829A4E-2BD6-44C2-95D7-541B8F82E923}"/>
+                  <a16:creationId xmlns="" xmlns:a16="http://schemas.microsoft.com/office/drawing/2014/main" id="{89829A4E-2BD6-44C2-95D7-541B8F82E923}"/>
                 </a:ext>
               </a:extLst>
             </p:cNvPr>
@@ -18160,7 +18099,7 @@
             <p:cNvPr id="97" name="Rectangle 62">
               <a:extLst>
                 <a:ext uri="{FF2B5EF4-FFF2-40B4-BE49-F238E27FC236}">
-                  <a16:creationId xmlns:a16="http://schemas.microsoft.com/office/drawing/2014/main" xmlns="" id="{298D4E7E-EED8-491B-8A0A-5EA4EA725539}"/>
+                  <a16:creationId xmlns="" xmlns:a16="http://schemas.microsoft.com/office/drawing/2014/main" id="{298D4E7E-EED8-491B-8A0A-5EA4EA725539}"/>
                 </a:ext>
               </a:extLst>
             </p:cNvPr>
@@ -18264,7 +18203,7 @@
             <p:cNvPr id="99" name="Rectangle 98">
               <a:extLst>
                 <a:ext uri="{FF2B5EF4-FFF2-40B4-BE49-F238E27FC236}">
-                  <a16:creationId xmlns:a16="http://schemas.microsoft.com/office/drawing/2014/main" xmlns="" id="{22D2FCA0-7BE2-46D8-B8D6-DE64A1E34A9F}"/>
+                  <a16:creationId xmlns="" xmlns:a16="http://schemas.microsoft.com/office/drawing/2014/main" id="{22D2FCA0-7BE2-46D8-B8D6-DE64A1E34A9F}"/>
                 </a:ext>
               </a:extLst>
             </p:cNvPr>
@@ -18317,7 +18256,7 @@
             <p:cNvPr id="100" name="Straight Arrow Connector 99">
               <a:extLst>
                 <a:ext uri="{FF2B5EF4-FFF2-40B4-BE49-F238E27FC236}">
-                  <a16:creationId xmlns:a16="http://schemas.microsoft.com/office/drawing/2014/main" xmlns="" id="{22607DA0-7EBB-4D04-93AE-CFD259F847D9}"/>
+                  <a16:creationId xmlns="" xmlns:a16="http://schemas.microsoft.com/office/drawing/2014/main" id="{22607DA0-7EBB-4D04-93AE-CFD259F847D9}"/>
                 </a:ext>
               </a:extLst>
             </p:cNvPr>
@@ -18410,7 +18349,7 @@
             <p:cNvPr id="102" name="Straight Arrow Connector 101">
               <a:extLst>
                 <a:ext uri="{FF2B5EF4-FFF2-40B4-BE49-F238E27FC236}">
-                  <a16:creationId xmlns:a16="http://schemas.microsoft.com/office/drawing/2014/main" xmlns="" id="{9FF4C9C2-8F37-4F5A-A44E-ACB1B565C80F}"/>
+                  <a16:creationId xmlns="" xmlns:a16="http://schemas.microsoft.com/office/drawing/2014/main" id="{9FF4C9C2-8F37-4F5A-A44E-ACB1B565C80F}"/>
                 </a:ext>
               </a:extLst>
             </p:cNvPr>
@@ -18456,7 +18395,7 @@
             <p:cNvPr id="103" name="Rectangle 62">
               <a:extLst>
                 <a:ext uri="{FF2B5EF4-FFF2-40B4-BE49-F238E27FC236}">
-                  <a16:creationId xmlns:a16="http://schemas.microsoft.com/office/drawing/2014/main" xmlns="" id="{298D4E7E-EED8-491B-8A0A-5EA4EA725539}"/>
+                  <a16:creationId xmlns="" xmlns:a16="http://schemas.microsoft.com/office/drawing/2014/main" id="{298D4E7E-EED8-491B-8A0A-5EA4EA725539}"/>
                 </a:ext>
               </a:extLst>
             </p:cNvPr>
@@ -18532,7 +18471,7 @@
             <p:cNvPr id="104" name="Straight Arrow Connector 103">
               <a:extLst>
                 <a:ext uri="{FF2B5EF4-FFF2-40B4-BE49-F238E27FC236}">
-                  <a16:creationId xmlns:a16="http://schemas.microsoft.com/office/drawing/2014/main" xmlns="" id="{39916E2E-195A-4DC8-B025-B05FA87E6796}"/>
+                  <a16:creationId xmlns="" xmlns:a16="http://schemas.microsoft.com/office/drawing/2014/main" id="{39916E2E-195A-4DC8-B025-B05FA87E6796}"/>
                 </a:ext>
               </a:extLst>
             </p:cNvPr>
@@ -18662,7 +18601,7 @@
             <p:cNvPr id="107" name="Rectangle 106">
               <a:extLst>
                 <a:ext uri="{FF2B5EF4-FFF2-40B4-BE49-F238E27FC236}">
-                  <a16:creationId xmlns:a16="http://schemas.microsoft.com/office/drawing/2014/main" xmlns="" id="{12879DF9-F252-4947-8358-26D8F2FD6F25}"/>
+                  <a16:creationId xmlns="" xmlns:a16="http://schemas.microsoft.com/office/drawing/2014/main" id="{12879DF9-F252-4947-8358-26D8F2FD6F25}"/>
                 </a:ext>
               </a:extLst>
             </p:cNvPr>
@@ -18715,7 +18654,7 @@
             <p:cNvPr id="108" name="Straight Arrow Connector 107">
               <a:extLst>
                 <a:ext uri="{FF2B5EF4-FFF2-40B4-BE49-F238E27FC236}">
-                  <a16:creationId xmlns:a16="http://schemas.microsoft.com/office/drawing/2014/main" xmlns="" id="{5A692F45-A4BC-4FF9-B3C1-7CEA15013252}"/>
+                  <a16:creationId xmlns="" xmlns:a16="http://schemas.microsoft.com/office/drawing/2014/main" id="{5A692F45-A4BC-4FF9-B3C1-7CEA15013252}"/>
                 </a:ext>
               </a:extLst>
             </p:cNvPr>
@@ -18801,7 +18740,7 @@
             <p:cNvPr id="110" name="Rectangle 62">
               <a:extLst>
                 <a:ext uri="{FF2B5EF4-FFF2-40B4-BE49-F238E27FC236}">
-                  <a16:creationId xmlns:a16="http://schemas.microsoft.com/office/drawing/2014/main" xmlns="" id="{A05565D0-E909-433C-87F8-C564FC30EF5F}"/>
+                  <a16:creationId xmlns="" xmlns:a16="http://schemas.microsoft.com/office/drawing/2014/main" id="{A05565D0-E909-433C-87F8-C564FC30EF5F}"/>
                 </a:ext>
               </a:extLst>
             </p:cNvPr>
@@ -18866,7 +18805,7 @@
             <p:cNvPr id="111" name="Straight Arrow Connector 110">
               <a:extLst>
                 <a:ext uri="{FF2B5EF4-FFF2-40B4-BE49-F238E27FC236}">
-                  <a16:creationId xmlns:a16="http://schemas.microsoft.com/office/drawing/2014/main" xmlns="" id="{39916E2E-195A-4DC8-B025-B05FA87E6796}"/>
+                  <a16:creationId xmlns="" xmlns:a16="http://schemas.microsoft.com/office/drawing/2014/main" id="{39916E2E-195A-4DC8-B025-B05FA87E6796}"/>
                 </a:ext>
               </a:extLst>
             </p:cNvPr>
@@ -18910,7 +18849,7 @@
             <p:cNvPr id="112" name="Rectangle 62">
               <a:extLst>
                 <a:ext uri="{FF2B5EF4-FFF2-40B4-BE49-F238E27FC236}">
-                  <a16:creationId xmlns:a16="http://schemas.microsoft.com/office/drawing/2014/main" xmlns="" id="{298D4E7E-EED8-491B-8A0A-5EA4EA725539}"/>
+                  <a16:creationId xmlns="" xmlns:a16="http://schemas.microsoft.com/office/drawing/2014/main" id="{298D4E7E-EED8-491B-8A0A-5EA4EA725539}"/>
                 </a:ext>
               </a:extLst>
             </p:cNvPr>
@@ -18983,7 +18922,7 @@
             <p:cNvPr id="113" name="TextBox 112">
               <a:extLst>
                 <a:ext uri="{FF2B5EF4-FFF2-40B4-BE49-F238E27FC236}">
-                  <a16:creationId xmlns:a16="http://schemas.microsoft.com/office/drawing/2014/main" xmlns="" id="{8A66125C-0A8A-4B7E-AFDE-067D51EC70EE}"/>
+                  <a16:creationId xmlns="" xmlns:a16="http://schemas.microsoft.com/office/drawing/2014/main" id="{8A66125C-0A8A-4B7E-AFDE-067D51EC70EE}"/>
                 </a:ext>
               </a:extLst>
             </p:cNvPr>
@@ -19036,7 +18975,7 @@
             <p:cNvPr id="114" name="TextBox 113">
               <a:extLst>
                 <a:ext uri="{FF2B5EF4-FFF2-40B4-BE49-F238E27FC236}">
-                  <a16:creationId xmlns:a16="http://schemas.microsoft.com/office/drawing/2014/main" xmlns="" id="{8A66125C-0A8A-4B7E-AFDE-067D51EC70EE}"/>
+                  <a16:creationId xmlns="" xmlns:a16="http://schemas.microsoft.com/office/drawing/2014/main" id="{8A66125C-0A8A-4B7E-AFDE-067D51EC70EE}"/>
                 </a:ext>
               </a:extLst>
             </p:cNvPr>
@@ -19083,7 +19022,7 @@
             <p:cNvPr id="115" name="Straight Arrow Connector 114">
               <a:extLst>
                 <a:ext uri="{FF2B5EF4-FFF2-40B4-BE49-F238E27FC236}">
-                  <a16:creationId xmlns:a16="http://schemas.microsoft.com/office/drawing/2014/main" xmlns="" id="{5A692F45-A4BC-4FF9-B3C1-7CEA15013252}"/>
+                  <a16:creationId xmlns="" xmlns:a16="http://schemas.microsoft.com/office/drawing/2014/main" id="{5A692F45-A4BC-4FF9-B3C1-7CEA15013252}"/>
                 </a:ext>
               </a:extLst>
             </p:cNvPr>
@@ -19129,7 +19068,7 @@
             <p:cNvPr id="116" name="TextBox 115">
               <a:extLst>
                 <a:ext uri="{FF2B5EF4-FFF2-40B4-BE49-F238E27FC236}">
-                  <a16:creationId xmlns:a16="http://schemas.microsoft.com/office/drawing/2014/main" xmlns="" id="{8A66125C-0A8A-4B7E-AFDE-067D51EC70EE}"/>
+                  <a16:creationId xmlns="" xmlns:a16="http://schemas.microsoft.com/office/drawing/2014/main" id="{8A66125C-0A8A-4B7E-AFDE-067D51EC70EE}"/>
                 </a:ext>
               </a:extLst>
             </p:cNvPr>
@@ -19176,7 +19115,7 @@
             <p:cNvPr id="117" name="Straight Arrow Connector 116">
               <a:extLst>
                 <a:ext uri="{FF2B5EF4-FFF2-40B4-BE49-F238E27FC236}">
-                  <a16:creationId xmlns:a16="http://schemas.microsoft.com/office/drawing/2014/main" xmlns="" id="{39916E2E-195A-4DC8-B025-B05FA87E6796}"/>
+                  <a16:creationId xmlns="" xmlns:a16="http://schemas.microsoft.com/office/drawing/2014/main" id="{39916E2E-195A-4DC8-B025-B05FA87E6796}"/>
                 </a:ext>
               </a:extLst>
             </p:cNvPr>
@@ -19265,7 +19204,7 @@
             <p:cNvPr id="3" name="Rectangle 65">
               <a:extLst>
                 <a:ext uri="{FF2B5EF4-FFF2-40B4-BE49-F238E27FC236}">
-                  <a16:creationId xmlns:a16="http://schemas.microsoft.com/office/drawing/2014/main" xmlns="" id="{2126271C-590E-4B60-8868-3D59B556D0C2}"/>
+                  <a16:creationId xmlns="" xmlns:a16="http://schemas.microsoft.com/office/drawing/2014/main" id="{2126271C-590E-4B60-8868-3D59B556D0C2}"/>
                 </a:ext>
               </a:extLst>
             </p:cNvPr>
@@ -19486,7 +19425,7 @@
           </p:nvSpPr>
           <p:spPr>
             <a:xfrm>
-              <a:off x="4385410" y="3525489"/>
+              <a:off x="4252992" y="3524273"/>
               <a:ext cx="1580463" cy="169277"/>
             </a:xfrm>
             <a:prstGeom prst="rect">
@@ -19517,7 +19456,7 @@
               </a:r>
               <a:r>
                 <a:rPr lang="en-US" sz="1100" dirty="0" smtClean="0"/>
-                <a:t>(o))</a:t>
+                <a:t>(o)</a:t>
               </a:r>
               <a:endParaRPr lang="en-US" sz="1100" dirty="0"/>
             </a:p>
@@ -19797,15 +19736,7 @@
                     <a:schemeClr val="bg1"/>
                   </a:solidFill>
                 </a:rPr>
-                <a:t>do:Delete</a:t>
-              </a:r>
-              <a:r>
-                <a:rPr lang="en-SG" sz="1100" dirty="0" err="1" smtClean="0">
-                  <a:solidFill>
-                    <a:schemeClr val="bg1"/>
-                  </a:solidFill>
-                </a:rPr>
-                <a:t>Order</a:t>
+                <a:t>do:DeleteOrder</a:t>
               </a:r>
               <a:endParaRPr lang="en-SG" sz="1100" dirty="0" smtClean="0">
                 <a:solidFill>
@@ -19836,7 +19767,7 @@
             <p:cNvPr id="14" name="Straight Arrow Connector 13">
               <a:extLst>
                 <a:ext uri="{FF2B5EF4-FFF2-40B4-BE49-F238E27FC236}">
-                  <a16:creationId xmlns:a16="http://schemas.microsoft.com/office/drawing/2014/main" xmlns="" id="{854D9FBB-2B36-4DC9-8B58-F7F177A8E586}"/>
+                  <a16:creationId xmlns="" xmlns:a16="http://schemas.microsoft.com/office/drawing/2014/main" id="{854D9FBB-2B36-4DC9-8B58-F7F177A8E586}"/>
                 </a:ext>
               </a:extLst>
             </p:cNvPr>
@@ -19883,7 +19814,7 @@
             <p:cNvPr id="15" name="Straight Arrow Connector 14">
               <a:extLst>
                 <a:ext uri="{FF2B5EF4-FFF2-40B4-BE49-F238E27FC236}">
-                  <a16:creationId xmlns:a16="http://schemas.microsoft.com/office/drawing/2014/main" xmlns="" id="{DDEE7225-6527-47E2-9C48-DE9485DD5A4F}"/>
+                  <a16:creationId xmlns="" xmlns:a16="http://schemas.microsoft.com/office/drawing/2014/main" id="{DDEE7225-6527-47E2-9C48-DE9485DD5A4F}"/>
                 </a:ext>
               </a:extLst>
             </p:cNvPr>
@@ -19927,7 +19858,7 @@
             <p:cNvPr id="16" name="Straight Arrow Connector 15">
               <a:extLst>
                 <a:ext uri="{FF2B5EF4-FFF2-40B4-BE49-F238E27FC236}">
-                  <a16:creationId xmlns:a16="http://schemas.microsoft.com/office/drawing/2014/main" xmlns="" id="{BF9AEA9C-54D0-4CB0-AE49-51A566B69F58}"/>
+                  <a16:creationId xmlns="" xmlns:a16="http://schemas.microsoft.com/office/drawing/2014/main" id="{BF9AEA9C-54D0-4CB0-AE49-51A566B69F58}"/>
                 </a:ext>
               </a:extLst>
             </p:cNvPr>
@@ -19973,7 +19904,7 @@
             <p:cNvPr id="17" name="Rectangle 62">
               <a:extLst>
                 <a:ext uri="{FF2B5EF4-FFF2-40B4-BE49-F238E27FC236}">
-                  <a16:creationId xmlns:a16="http://schemas.microsoft.com/office/drawing/2014/main" xmlns="" id="{61FF3397-EF07-4016-8098-DAEF482C4389}"/>
+                  <a16:creationId xmlns="" xmlns:a16="http://schemas.microsoft.com/office/drawing/2014/main" id="{61FF3397-EF07-4016-8098-DAEF482C4389}"/>
                 </a:ext>
               </a:extLst>
             </p:cNvPr>
@@ -20046,7 +19977,7 @@
             <p:cNvPr id="18" name="Straight Connector 17">
               <a:extLst>
                 <a:ext uri="{FF2B5EF4-FFF2-40B4-BE49-F238E27FC236}">
-                  <a16:creationId xmlns:a16="http://schemas.microsoft.com/office/drawing/2014/main" xmlns="" id="{22D3ED81-D4BA-4011-B139-8213177BA215}"/>
+                  <a16:creationId xmlns="" xmlns:a16="http://schemas.microsoft.com/office/drawing/2014/main" id="{22D3ED81-D4BA-4011-B139-8213177BA215}"/>
                 </a:ext>
               </a:extLst>
             </p:cNvPr>
@@ -20091,7 +20022,7 @@
             <p:cNvPr id="19" name="Rectangle 18">
               <a:extLst>
                 <a:ext uri="{FF2B5EF4-FFF2-40B4-BE49-F238E27FC236}">
-                  <a16:creationId xmlns:a16="http://schemas.microsoft.com/office/drawing/2014/main" xmlns="" id="{A96B530B-5601-46A7-9B8D-33C8DDA39964}"/>
+                  <a16:creationId xmlns="" xmlns:a16="http://schemas.microsoft.com/office/drawing/2014/main" id="{A96B530B-5601-46A7-9B8D-33C8DDA39964}"/>
                 </a:ext>
               </a:extLst>
             </p:cNvPr>
@@ -20144,7 +20075,7 @@
             <p:cNvPr id="20" name="TextBox 19">
               <a:extLst>
                 <a:ext uri="{FF2B5EF4-FFF2-40B4-BE49-F238E27FC236}">
-                  <a16:creationId xmlns:a16="http://schemas.microsoft.com/office/drawing/2014/main" xmlns="" id="{95F03D45-B1FD-49BA-8758-8ED58ACA2B5C}"/>
+                  <a16:creationId xmlns="" xmlns:a16="http://schemas.microsoft.com/office/drawing/2014/main" id="{95F03D45-B1FD-49BA-8758-8ED58ACA2B5C}"/>
                 </a:ext>
               </a:extLst>
             </p:cNvPr>
@@ -20207,7 +20138,7 @@
             <p:cNvPr id="21" name="Straight Connector 20">
               <a:extLst>
                 <a:ext uri="{FF2B5EF4-FFF2-40B4-BE49-F238E27FC236}">
-                  <a16:creationId xmlns:a16="http://schemas.microsoft.com/office/drawing/2014/main" xmlns="" id="{2DA8FBC2-6B42-43C0-BBEC-CF189FD87668}"/>
+                  <a16:creationId xmlns="" xmlns:a16="http://schemas.microsoft.com/office/drawing/2014/main" id="{2DA8FBC2-6B42-43C0-BBEC-CF189FD87668}"/>
                 </a:ext>
               </a:extLst>
             </p:cNvPr>
@@ -20252,7 +20183,7 @@
             <p:cNvPr id="22" name="Rectangle 21">
               <a:extLst>
                 <a:ext uri="{FF2B5EF4-FFF2-40B4-BE49-F238E27FC236}">
-                  <a16:creationId xmlns:a16="http://schemas.microsoft.com/office/drawing/2014/main" xmlns="" id="{04305CEA-EBD1-45C9-97BE-ECFE3AC3D249}"/>
+                  <a16:creationId xmlns="" xmlns:a16="http://schemas.microsoft.com/office/drawing/2014/main" id="{04305CEA-EBD1-45C9-97BE-ECFE3AC3D249}"/>
                 </a:ext>
               </a:extLst>
             </p:cNvPr>
@@ -20305,7 +20236,7 @@
             <p:cNvPr id="23" name="TextBox 22">
               <a:extLst>
                 <a:ext uri="{FF2B5EF4-FFF2-40B4-BE49-F238E27FC236}">
-                  <a16:creationId xmlns:a16="http://schemas.microsoft.com/office/drawing/2014/main" xmlns="" id="{81B0FA7A-7734-4574-BB3A-865D46A3AB9C}"/>
+                  <a16:creationId xmlns="" xmlns:a16="http://schemas.microsoft.com/office/drawing/2014/main" id="{81B0FA7A-7734-4574-BB3A-865D46A3AB9C}"/>
                 </a:ext>
               </a:extLst>
             </p:cNvPr>
@@ -20355,7 +20286,7 @@
             <p:cNvPr id="24" name="TextBox 23">
               <a:extLst>
                 <a:ext uri="{FF2B5EF4-FFF2-40B4-BE49-F238E27FC236}">
-                  <a16:creationId xmlns:a16="http://schemas.microsoft.com/office/drawing/2014/main" xmlns="" id="{E89E7A9A-19E7-4F1A-ABAF-9356340673CC}"/>
+                  <a16:creationId xmlns="" xmlns:a16="http://schemas.microsoft.com/office/drawing/2014/main" id="{E89E7A9A-19E7-4F1A-ABAF-9356340673CC}"/>
                 </a:ext>
               </a:extLst>
             </p:cNvPr>
@@ -20405,7 +20336,7 @@
             <p:cNvPr id="25" name="Rectangle 24">
               <a:extLst>
                 <a:ext uri="{FF2B5EF4-FFF2-40B4-BE49-F238E27FC236}">
-                  <a16:creationId xmlns:a16="http://schemas.microsoft.com/office/drawing/2014/main" xmlns="" id="{12879DF9-F252-4947-8358-26D8F2FD6F25}"/>
+                  <a16:creationId xmlns="" xmlns:a16="http://schemas.microsoft.com/office/drawing/2014/main" id="{12879DF9-F252-4947-8358-26D8F2FD6F25}"/>
                 </a:ext>
               </a:extLst>
             </p:cNvPr>
@@ -20458,7 +20389,7 @@
             <p:cNvPr id="26" name="Straight Arrow Connector 25">
               <a:extLst>
                 <a:ext uri="{FF2B5EF4-FFF2-40B4-BE49-F238E27FC236}">
-                  <a16:creationId xmlns:a16="http://schemas.microsoft.com/office/drawing/2014/main" xmlns="" id="{A1426F86-A101-449E-8BB7-81C92FFDABFC}"/>
+                  <a16:creationId xmlns="" xmlns:a16="http://schemas.microsoft.com/office/drawing/2014/main" id="{A1426F86-A101-449E-8BB7-81C92FFDABFC}"/>
                 </a:ext>
               </a:extLst>
             </p:cNvPr>
@@ -20502,7 +20433,7 @@
             <p:cNvPr id="27" name="Straight Arrow Connector 26">
               <a:extLst>
                 <a:ext uri="{FF2B5EF4-FFF2-40B4-BE49-F238E27FC236}">
-                  <a16:creationId xmlns:a16="http://schemas.microsoft.com/office/drawing/2014/main" xmlns="" id="{5A692F45-A4BC-4FF9-B3C1-7CEA15013252}"/>
+                  <a16:creationId xmlns="" xmlns:a16="http://schemas.microsoft.com/office/drawing/2014/main" id="{5A692F45-A4BC-4FF9-B3C1-7CEA15013252}"/>
                 </a:ext>
               </a:extLst>
             </p:cNvPr>
@@ -20548,7 +20479,7 @@
             <p:cNvPr id="28" name="Straight Arrow Connector 27">
               <a:extLst>
                 <a:ext uri="{FF2B5EF4-FFF2-40B4-BE49-F238E27FC236}">
-                  <a16:creationId xmlns:a16="http://schemas.microsoft.com/office/drawing/2014/main" xmlns="" id="{F316D50F-9AF5-45BB-A814-DED5EA02E797}"/>
+                  <a16:creationId xmlns="" xmlns:a16="http://schemas.microsoft.com/office/drawing/2014/main" id="{F316D50F-9AF5-45BB-A814-DED5EA02E797}"/>
                 </a:ext>
               </a:extLst>
             </p:cNvPr>
@@ -20592,7 +20523,7 @@
             <p:cNvPr id="29" name="Straight Arrow Connector 28">
               <a:extLst>
                 <a:ext uri="{FF2B5EF4-FFF2-40B4-BE49-F238E27FC236}">
-                  <a16:creationId xmlns:a16="http://schemas.microsoft.com/office/drawing/2014/main" xmlns="" id="{0C2EB6B9-B95A-43BC-861F-54F7C85EECD7}"/>
+                  <a16:creationId xmlns="" xmlns:a16="http://schemas.microsoft.com/office/drawing/2014/main" id="{0C2EB6B9-B95A-43BC-861F-54F7C85EECD7}"/>
                 </a:ext>
               </a:extLst>
             </p:cNvPr>
@@ -20638,7 +20569,7 @@
             <p:cNvPr id="30" name="Rectangle 62">
               <a:extLst>
                 <a:ext uri="{FF2B5EF4-FFF2-40B4-BE49-F238E27FC236}">
-                  <a16:creationId xmlns:a16="http://schemas.microsoft.com/office/drawing/2014/main" xmlns="" id="{298D4E7E-EED8-491B-8A0A-5EA4EA725539}"/>
+                  <a16:creationId xmlns="" xmlns:a16="http://schemas.microsoft.com/office/drawing/2014/main" id="{298D4E7E-EED8-491B-8A0A-5EA4EA725539}"/>
                 </a:ext>
               </a:extLst>
             </p:cNvPr>
@@ -20727,7 +20658,7 @@
             <p:cNvPr id="31" name="TextBox 30">
               <a:extLst>
                 <a:ext uri="{FF2B5EF4-FFF2-40B4-BE49-F238E27FC236}">
-                  <a16:creationId xmlns:a16="http://schemas.microsoft.com/office/drawing/2014/main" xmlns="" id="{8A66125C-0A8A-4B7E-AFDE-067D51EC70EE}"/>
+                  <a16:creationId xmlns="" xmlns:a16="http://schemas.microsoft.com/office/drawing/2014/main" id="{8A66125C-0A8A-4B7E-AFDE-067D51EC70EE}"/>
                 </a:ext>
               </a:extLst>
             </p:cNvPr>
@@ -20763,11 +20694,7 @@
             <a:p>
               <a:r>
                 <a:rPr lang="en-US" sz="1100" dirty="0" err="1" smtClean="0"/>
-                <a:t>Delete</a:t>
-              </a:r>
-              <a:r>
-                <a:rPr lang="en-US" sz="1100" dirty="0" err="1" smtClean="0"/>
-                <a:t>Order</a:t>
+                <a:t>DeleteOrder</a:t>
               </a:r>
               <a:endParaRPr lang="en-US" sz="1100" dirty="0"/>
             </a:p>
@@ -20785,7 +20712,7 @@
             <p:cNvPr id="32" name="Rectangle 31">
               <a:extLst>
                 <a:ext uri="{FF2B5EF4-FFF2-40B4-BE49-F238E27FC236}">
-                  <a16:creationId xmlns:a16="http://schemas.microsoft.com/office/drawing/2014/main" xmlns="" id="{22D2FCA0-7BE2-46D8-B8D6-DE64A1E34A9F}"/>
+                  <a16:creationId xmlns="" xmlns:a16="http://schemas.microsoft.com/office/drawing/2014/main" id="{22D2FCA0-7BE2-46D8-B8D6-DE64A1E34A9F}"/>
                 </a:ext>
               </a:extLst>
             </p:cNvPr>
@@ -20838,7 +20765,7 @@
             <p:cNvPr id="33" name="Straight Arrow Connector 32">
               <a:extLst>
                 <a:ext uri="{FF2B5EF4-FFF2-40B4-BE49-F238E27FC236}">
-                  <a16:creationId xmlns:a16="http://schemas.microsoft.com/office/drawing/2014/main" xmlns="" id="{9FF4C9C2-8F37-4F5A-A44E-ACB1B565C80F}"/>
+                  <a16:creationId xmlns="" xmlns:a16="http://schemas.microsoft.com/office/drawing/2014/main" id="{9FF4C9C2-8F37-4F5A-A44E-ACB1B565C80F}"/>
                 </a:ext>
               </a:extLst>
             </p:cNvPr>
@@ -20884,7 +20811,7 @@
             <p:cNvPr id="34" name="TextBox 33">
               <a:extLst>
                 <a:ext uri="{FF2B5EF4-FFF2-40B4-BE49-F238E27FC236}">
-                  <a16:creationId xmlns:a16="http://schemas.microsoft.com/office/drawing/2014/main" xmlns="" id="{CAF6EAA2-E1B3-4146-9FD1-EED02820840E}"/>
+                  <a16:creationId xmlns="" xmlns:a16="http://schemas.microsoft.com/office/drawing/2014/main" id="{CAF6EAA2-E1B3-4146-9FD1-EED02820840E}"/>
                 </a:ext>
               </a:extLst>
             </p:cNvPr>
@@ -20923,7 +20850,7 @@
             <p:cNvPr id="35" name="Straight Arrow Connector 34">
               <a:extLst>
                 <a:ext uri="{FF2B5EF4-FFF2-40B4-BE49-F238E27FC236}">
-                  <a16:creationId xmlns:a16="http://schemas.microsoft.com/office/drawing/2014/main" xmlns="" id="{3DB62E95-D983-49BD-93B5-D53F5ED931D4}"/>
+                  <a16:creationId xmlns="" xmlns:a16="http://schemas.microsoft.com/office/drawing/2014/main" id="{3DB62E95-D983-49BD-93B5-D53F5ED931D4}"/>
                 </a:ext>
               </a:extLst>
             </p:cNvPr>
@@ -20967,7 +20894,7 @@
             <p:cNvPr id="36" name="TextBox 35">
               <a:extLst>
                 <a:ext uri="{FF2B5EF4-FFF2-40B4-BE49-F238E27FC236}">
-                  <a16:creationId xmlns:a16="http://schemas.microsoft.com/office/drawing/2014/main" xmlns="" id="{0C0656C6-C19E-4524-AFA8-7C3E64F61000}"/>
+                  <a16:creationId xmlns="" xmlns:a16="http://schemas.microsoft.com/office/drawing/2014/main" id="{0C0656C6-C19E-4524-AFA8-7C3E64F61000}"/>
                 </a:ext>
               </a:extLst>
             </p:cNvPr>
@@ -21013,7 +20940,7 @@
             <p:cNvPr id="37" name="TextBox 36">
               <a:extLst>
                 <a:ext uri="{FF2B5EF4-FFF2-40B4-BE49-F238E27FC236}">
-                  <a16:creationId xmlns:a16="http://schemas.microsoft.com/office/drawing/2014/main" xmlns="" id="{89829A4E-2BD6-44C2-95D7-541B8F82E923}"/>
+                  <a16:creationId xmlns="" xmlns:a16="http://schemas.microsoft.com/office/drawing/2014/main" id="{89829A4E-2BD6-44C2-95D7-541B8F82E923}"/>
                 </a:ext>
               </a:extLst>
             </p:cNvPr>
@@ -21097,7 +21024,7 @@
             <p:cNvPr id="39" name="Rectangle 62">
               <a:extLst>
                 <a:ext uri="{FF2B5EF4-FFF2-40B4-BE49-F238E27FC236}">
-                  <a16:creationId xmlns:a16="http://schemas.microsoft.com/office/drawing/2014/main" xmlns="" id="{298D4E7E-EED8-491B-8A0A-5EA4EA725539}"/>
+                  <a16:creationId xmlns="" xmlns:a16="http://schemas.microsoft.com/office/drawing/2014/main" id="{298D4E7E-EED8-491B-8A0A-5EA4EA725539}"/>
                 </a:ext>
               </a:extLst>
             </p:cNvPr>
@@ -21201,7 +21128,7 @@
             <p:cNvPr id="41" name="Rectangle 40">
               <a:extLst>
                 <a:ext uri="{FF2B5EF4-FFF2-40B4-BE49-F238E27FC236}">
-                  <a16:creationId xmlns:a16="http://schemas.microsoft.com/office/drawing/2014/main" xmlns="" id="{22D2FCA0-7BE2-46D8-B8D6-DE64A1E34A9F}"/>
+                  <a16:creationId xmlns="" xmlns:a16="http://schemas.microsoft.com/office/drawing/2014/main" id="{22D2FCA0-7BE2-46D8-B8D6-DE64A1E34A9F}"/>
                 </a:ext>
               </a:extLst>
             </p:cNvPr>
@@ -21254,7 +21181,7 @@
             <p:cNvPr id="42" name="Straight Arrow Connector 41">
               <a:extLst>
                 <a:ext uri="{FF2B5EF4-FFF2-40B4-BE49-F238E27FC236}">
-                  <a16:creationId xmlns:a16="http://schemas.microsoft.com/office/drawing/2014/main" xmlns="" id="{22607DA0-7EBB-4D04-93AE-CFD259F847D9}"/>
+                  <a16:creationId xmlns="" xmlns:a16="http://schemas.microsoft.com/office/drawing/2014/main" id="{22607DA0-7EBB-4D04-93AE-CFD259F847D9}"/>
                 </a:ext>
               </a:extLst>
             </p:cNvPr>
@@ -21347,7 +21274,7 @@
             <p:cNvPr id="44" name="Straight Arrow Connector 43">
               <a:extLst>
                 <a:ext uri="{FF2B5EF4-FFF2-40B4-BE49-F238E27FC236}">
-                  <a16:creationId xmlns:a16="http://schemas.microsoft.com/office/drawing/2014/main" xmlns="" id="{9FF4C9C2-8F37-4F5A-A44E-ACB1B565C80F}"/>
+                  <a16:creationId xmlns="" xmlns:a16="http://schemas.microsoft.com/office/drawing/2014/main" id="{9FF4C9C2-8F37-4F5A-A44E-ACB1B565C80F}"/>
                 </a:ext>
               </a:extLst>
             </p:cNvPr>
@@ -21393,7 +21320,7 @@
             <p:cNvPr id="45" name="Rectangle 62">
               <a:extLst>
                 <a:ext uri="{FF2B5EF4-FFF2-40B4-BE49-F238E27FC236}">
-                  <a16:creationId xmlns:a16="http://schemas.microsoft.com/office/drawing/2014/main" xmlns="" id="{298D4E7E-EED8-491B-8A0A-5EA4EA725539}"/>
+                  <a16:creationId xmlns="" xmlns:a16="http://schemas.microsoft.com/office/drawing/2014/main" id="{298D4E7E-EED8-491B-8A0A-5EA4EA725539}"/>
                 </a:ext>
               </a:extLst>
             </p:cNvPr>
@@ -21469,7 +21396,7 @@
             <p:cNvPr id="46" name="Straight Arrow Connector 45">
               <a:extLst>
                 <a:ext uri="{FF2B5EF4-FFF2-40B4-BE49-F238E27FC236}">
-                  <a16:creationId xmlns:a16="http://schemas.microsoft.com/office/drawing/2014/main" xmlns="" id="{39916E2E-195A-4DC8-B025-B05FA87E6796}"/>
+                  <a16:creationId xmlns="" xmlns:a16="http://schemas.microsoft.com/office/drawing/2014/main" id="{39916E2E-195A-4DC8-B025-B05FA87E6796}"/>
                 </a:ext>
               </a:extLst>
             </p:cNvPr>
@@ -21599,7 +21526,7 @@
             <p:cNvPr id="49" name="Rectangle 48">
               <a:extLst>
                 <a:ext uri="{FF2B5EF4-FFF2-40B4-BE49-F238E27FC236}">
-                  <a16:creationId xmlns:a16="http://schemas.microsoft.com/office/drawing/2014/main" xmlns="" id="{12879DF9-F252-4947-8358-26D8F2FD6F25}"/>
+                  <a16:creationId xmlns="" xmlns:a16="http://schemas.microsoft.com/office/drawing/2014/main" id="{12879DF9-F252-4947-8358-26D8F2FD6F25}"/>
                 </a:ext>
               </a:extLst>
             </p:cNvPr>
@@ -21652,7 +21579,7 @@
             <p:cNvPr id="50" name="Straight Arrow Connector 49">
               <a:extLst>
                 <a:ext uri="{FF2B5EF4-FFF2-40B4-BE49-F238E27FC236}">
-                  <a16:creationId xmlns:a16="http://schemas.microsoft.com/office/drawing/2014/main" xmlns="" id="{5A692F45-A4BC-4FF9-B3C1-7CEA15013252}"/>
+                  <a16:creationId xmlns="" xmlns:a16="http://schemas.microsoft.com/office/drawing/2014/main" id="{5A692F45-A4BC-4FF9-B3C1-7CEA15013252}"/>
                 </a:ext>
               </a:extLst>
             </p:cNvPr>
@@ -21738,7 +21665,7 @@
             <p:cNvPr id="52" name="Rectangle 62">
               <a:extLst>
                 <a:ext uri="{FF2B5EF4-FFF2-40B4-BE49-F238E27FC236}">
-                  <a16:creationId xmlns:a16="http://schemas.microsoft.com/office/drawing/2014/main" xmlns="" id="{A05565D0-E909-433C-87F8-C564FC30EF5F}"/>
+                  <a16:creationId xmlns="" xmlns:a16="http://schemas.microsoft.com/office/drawing/2014/main" id="{A05565D0-E909-433C-87F8-C564FC30EF5F}"/>
                 </a:ext>
               </a:extLst>
             </p:cNvPr>
@@ -21803,7 +21730,7 @@
             <p:cNvPr id="53" name="Straight Arrow Connector 52">
               <a:extLst>
                 <a:ext uri="{FF2B5EF4-FFF2-40B4-BE49-F238E27FC236}">
-                  <a16:creationId xmlns:a16="http://schemas.microsoft.com/office/drawing/2014/main" xmlns="" id="{39916E2E-195A-4DC8-B025-B05FA87E6796}"/>
+                  <a16:creationId xmlns="" xmlns:a16="http://schemas.microsoft.com/office/drawing/2014/main" id="{39916E2E-195A-4DC8-B025-B05FA87E6796}"/>
                 </a:ext>
               </a:extLst>
             </p:cNvPr>
@@ -21847,7 +21774,7 @@
             <p:cNvPr id="54" name="Rectangle 62">
               <a:extLst>
                 <a:ext uri="{FF2B5EF4-FFF2-40B4-BE49-F238E27FC236}">
-                  <a16:creationId xmlns:a16="http://schemas.microsoft.com/office/drawing/2014/main" xmlns="" id="{298D4E7E-EED8-491B-8A0A-5EA4EA725539}"/>
+                  <a16:creationId xmlns="" xmlns:a16="http://schemas.microsoft.com/office/drawing/2014/main" id="{298D4E7E-EED8-491B-8A0A-5EA4EA725539}"/>
                 </a:ext>
               </a:extLst>
             </p:cNvPr>
@@ -21920,7 +21847,7 @@
             <p:cNvPr id="55" name="TextBox 54">
               <a:extLst>
                 <a:ext uri="{FF2B5EF4-FFF2-40B4-BE49-F238E27FC236}">
-                  <a16:creationId xmlns:a16="http://schemas.microsoft.com/office/drawing/2014/main" xmlns="" id="{8A66125C-0A8A-4B7E-AFDE-067D51EC70EE}"/>
+                  <a16:creationId xmlns="" xmlns:a16="http://schemas.microsoft.com/office/drawing/2014/main" id="{8A66125C-0A8A-4B7E-AFDE-067D51EC70EE}"/>
                 </a:ext>
               </a:extLst>
             </p:cNvPr>
@@ -21973,7 +21900,7 @@
             <p:cNvPr id="56" name="TextBox 55">
               <a:extLst>
                 <a:ext uri="{FF2B5EF4-FFF2-40B4-BE49-F238E27FC236}">
-                  <a16:creationId xmlns:a16="http://schemas.microsoft.com/office/drawing/2014/main" xmlns="" id="{8A66125C-0A8A-4B7E-AFDE-067D51EC70EE}"/>
+                  <a16:creationId xmlns="" xmlns:a16="http://schemas.microsoft.com/office/drawing/2014/main" id="{8A66125C-0A8A-4B7E-AFDE-067D51EC70EE}"/>
                 </a:ext>
               </a:extLst>
             </p:cNvPr>
@@ -22020,7 +21947,7 @@
             <p:cNvPr id="57" name="Straight Arrow Connector 56">
               <a:extLst>
                 <a:ext uri="{FF2B5EF4-FFF2-40B4-BE49-F238E27FC236}">
-                  <a16:creationId xmlns:a16="http://schemas.microsoft.com/office/drawing/2014/main" xmlns="" id="{5A692F45-A4BC-4FF9-B3C1-7CEA15013252}"/>
+                  <a16:creationId xmlns="" xmlns:a16="http://schemas.microsoft.com/office/drawing/2014/main" id="{5A692F45-A4BC-4FF9-B3C1-7CEA15013252}"/>
                 </a:ext>
               </a:extLst>
             </p:cNvPr>
@@ -22066,7 +21993,7 @@
             <p:cNvPr id="58" name="TextBox 57">
               <a:extLst>
                 <a:ext uri="{FF2B5EF4-FFF2-40B4-BE49-F238E27FC236}">
-                  <a16:creationId xmlns:a16="http://schemas.microsoft.com/office/drawing/2014/main" xmlns="" id="{8A66125C-0A8A-4B7E-AFDE-067D51EC70EE}"/>
+                  <a16:creationId xmlns="" xmlns:a16="http://schemas.microsoft.com/office/drawing/2014/main" id="{8A66125C-0A8A-4B7E-AFDE-067D51EC70EE}"/>
                 </a:ext>
               </a:extLst>
             </p:cNvPr>
@@ -22117,7 +22044,7 @@
             <p:cNvPr id="59" name="Straight Arrow Connector 58">
               <a:extLst>
                 <a:ext uri="{FF2B5EF4-FFF2-40B4-BE49-F238E27FC236}">
-                  <a16:creationId xmlns:a16="http://schemas.microsoft.com/office/drawing/2014/main" xmlns="" id="{39916E2E-195A-4DC8-B025-B05FA87E6796}"/>
+                  <a16:creationId xmlns="" xmlns:a16="http://schemas.microsoft.com/office/drawing/2014/main" id="{39916E2E-195A-4DC8-B025-B05FA87E6796}"/>
                 </a:ext>
               </a:extLst>
             </p:cNvPr>

</xml_diff>